<commit_message>
minor improvements of the final presentation
</commit_message>
<xml_diff>
--- a/presentation/20170106-master-defense.pptx
+++ b/presentation/20170106-master-defense.pptx
@@ -223,7 +223,7 @@
           <a:p>
             <a:fld id="{91A79A0D-7D40-48AF-9AC8-3B71E119E35B}" type="datetimeFigureOut">
               <a:rPr lang="de-DE" smtClean="0"/>
-              <a:t>16.06.2017</a:t>
+              <a:t>24.06.2017</a:t>
             </a:fld>
             <a:endParaRPr lang="de-DE"/>
           </a:p>
@@ -388,7 +388,7 @@
           <a:p>
             <a:fld id="{50B8443B-8591-4186-BA0E-583841011C27}" type="datetimeFigureOut">
               <a:rPr lang="de-DE" smtClean="0"/>
-              <a:t>16.06.2017</a:t>
+              <a:t>24.06.2017</a:t>
             </a:fld>
             <a:endParaRPr lang="de-DE"/>
           </a:p>
@@ -1397,7 +1397,7 @@
           <a:p>
             <a:fld id="{A5974D0C-3C07-4C76-9806-51838E346B84}" type="datetime1">
               <a:rPr lang="de-DE" smtClean="0"/>
-              <a:t>16.06.2017</a:t>
+              <a:t>24.06.2017</a:t>
             </a:fld>
             <a:endParaRPr lang="de-DE"/>
           </a:p>
@@ -1604,7 +1604,7 @@
           <a:p>
             <a:fld id="{548C4524-1C23-4F93-8032-046ADF7D363A}" type="datetime1">
               <a:rPr lang="de-DE" smtClean="0"/>
-              <a:t>16.06.2017</a:t>
+              <a:t>24.06.2017</a:t>
             </a:fld>
             <a:endParaRPr lang="de-DE"/>
           </a:p>
@@ -1832,7 +1832,7 @@
             <a:fld id="{FCD7E7C2-4B8F-4989-ACDA-BBBEECDFB473}" type="datetime1">
               <a:rPr lang="de-DE" smtClean="0"/>
               <a:pPr/>
-              <a:t>16.06.2017</a:t>
+              <a:t>24.06.2017</a:t>
             </a:fld>
             <a:endParaRPr lang="de-DE" dirty="0"/>
           </a:p>
@@ -2396,7 +2396,7 @@
           <a:p>
             <a:fld id="{B3521F2F-19F7-4745-A7E5-D6FC4A395C8D}" type="datetime1">
               <a:rPr lang="de-DE" smtClean="0"/>
-              <a:t>16.06.2017</a:t>
+              <a:t>24.06.2017</a:t>
             </a:fld>
             <a:endParaRPr lang="de-DE"/>
           </a:p>
@@ -2790,7 +2790,7 @@
           <a:p>
             <a:fld id="{5B03B32A-C2D8-44A4-B6F4-358B815D4703}" type="datetime1">
               <a:rPr lang="de-DE" smtClean="0"/>
-              <a:t>16.06.2017</a:t>
+              <a:t>24.06.2017</a:t>
             </a:fld>
             <a:endParaRPr lang="de-DE"/>
           </a:p>
@@ -2935,7 +2935,7 @@
           <a:p>
             <a:fld id="{6DC45F1C-52C5-4399-9FBB-A699DC92C7AE}" type="datetime1">
               <a:rPr lang="de-DE" smtClean="0"/>
-              <a:t>16.06.2017</a:t>
+              <a:t>24.06.2017</a:t>
             </a:fld>
             <a:endParaRPr lang="de-DE"/>
           </a:p>
@@ -3057,7 +3057,7 @@
           <a:p>
             <a:fld id="{5D7C8DF1-CB90-4C66-91F8-DAAE9ADE1353}" type="datetime1">
               <a:rPr lang="de-DE" smtClean="0"/>
-              <a:t>16.06.2017</a:t>
+              <a:t>24.06.2017</a:t>
             </a:fld>
             <a:endParaRPr lang="de-DE"/>
           </a:p>
@@ -3361,7 +3361,7 @@
           <a:p>
             <a:fld id="{6966B97A-897C-4531-94E8-5C4EA180FDBB}" type="datetime1">
               <a:rPr lang="de-DE" smtClean="0"/>
-              <a:t>16.06.2017</a:t>
+              <a:t>24.06.2017</a:t>
             </a:fld>
             <a:endParaRPr lang="de-DE"/>
           </a:p>
@@ -3641,7 +3641,7 @@
           <a:p>
             <a:fld id="{CCE2A79C-697E-42A0-AA75-FCDA7BBCDF59}" type="datetime1">
               <a:rPr lang="de-DE" smtClean="0"/>
-              <a:t>16.06.2017</a:t>
+              <a:t>24.06.2017</a:t>
             </a:fld>
             <a:endParaRPr lang="de-DE"/>
           </a:p>
@@ -4443,7 +4443,7 @@
           <a:p>
             <a:fld id="{21944E0F-9EDA-4706-90E4-491605A404BD}" type="datetime1">
               <a:rPr lang="de-DE" smtClean="0"/>
-              <a:t>16.06.2017</a:t>
+              <a:t>24.06.2017</a:t>
             </a:fld>
             <a:endParaRPr lang="de-DE" dirty="0"/>
           </a:p>
@@ -4724,43 +4724,21 @@
                                   </p:childTnLst>
                                 </p:cTn>
                               </p:par>
-                            </p:childTnLst>
-                          </p:cTn>
-                        </p:par>
-                      </p:childTnLst>
-                    </p:cTn>
-                  </p:par>
-                  <p:par>
-                    <p:cTn id="13" fill="hold">
-                      <p:stCondLst>
-                        <p:cond delay="indefinite"/>
-                      </p:stCondLst>
-                      <p:childTnLst>
-                        <p:par>
-                          <p:cTn id="14" fill="hold">
-                            <p:stCondLst>
-                              <p:cond delay="0"/>
-                            </p:stCondLst>
-                            <p:childTnLst>
                               <p:par>
-                                <p:cTn id="15" presetID="1" presetClass="entr" presetSubtype="0" fill="hold" grpId="0" nodeType="clickEffect">
+                                <p:cTn id="13" presetID="1" presetClass="entr" presetSubtype="0" fill="hold" grpId="0" nodeType="withEffect">
                                   <p:stCondLst>
                                     <p:cond delay="0"/>
                                   </p:stCondLst>
                                   <p:childTnLst>
                                     <p:set>
                                       <p:cBhvr>
-                                        <p:cTn id="16" dur="1" fill="hold">
+                                        <p:cTn id="14" dur="1" fill="hold">
                                           <p:stCondLst>
                                             <p:cond delay="0"/>
                                           </p:stCondLst>
                                         </p:cTn>
                                         <p:tgtEl>
-                                          <p:spTgt spid="5">
-                                            <p:txEl>
-                                              <p:pRg st="2" end="2"/>
-                                            </p:txEl>
-                                          </p:spTgt>
+                                          <p:spTgt spid="9"/>
                                         </p:tgtEl>
                                         <p:attrNameLst>
                                           <p:attrName>style.visibility</p:attrName>
@@ -4773,8 +4751,26 @@
                                   </p:childTnLst>
                                 </p:cTn>
                               </p:par>
+                            </p:childTnLst>
+                          </p:cTn>
+                        </p:par>
+                      </p:childTnLst>
+                    </p:cTn>
+                  </p:par>
+                  <p:par>
+                    <p:cTn id="15" fill="hold">
+                      <p:stCondLst>
+                        <p:cond delay="indefinite"/>
+                      </p:stCondLst>
+                      <p:childTnLst>
+                        <p:par>
+                          <p:cTn id="16" fill="hold">
+                            <p:stCondLst>
+                              <p:cond delay="0"/>
+                            </p:stCondLst>
+                            <p:childTnLst>
                               <p:par>
-                                <p:cTn id="17" presetID="1" presetClass="entr" presetSubtype="0" fill="hold" grpId="0" nodeType="withEffect">
+                                <p:cTn id="17" presetID="1" presetClass="entr" presetSubtype="0" fill="hold" grpId="0" nodeType="clickEffect">
                                   <p:stCondLst>
                                     <p:cond delay="0"/>
                                   </p:stCondLst>
@@ -4789,7 +4785,7 @@
                                         <p:tgtEl>
                                           <p:spTgt spid="5">
                                             <p:txEl>
-                                              <p:pRg st="3" end="3"/>
+                                              <p:pRg st="2" end="2"/>
                                             </p:txEl>
                                           </p:spTgt>
                                         </p:tgtEl>
@@ -4820,7 +4816,7 @@
                                         <p:tgtEl>
                                           <p:spTgt spid="5">
                                             <p:txEl>
-                                              <p:pRg st="4" end="4"/>
+                                              <p:pRg st="3" end="3"/>
                                             </p:txEl>
                                           </p:spTgt>
                                         </p:tgtEl>
@@ -4851,6 +4847,37 @@
                                         <p:tgtEl>
                                           <p:spTgt spid="5">
                                             <p:txEl>
+                                              <p:pRg st="4" end="4"/>
+                                            </p:txEl>
+                                          </p:spTgt>
+                                        </p:tgtEl>
+                                        <p:attrNameLst>
+                                          <p:attrName>style.visibility</p:attrName>
+                                        </p:attrNameLst>
+                                      </p:cBhvr>
+                                      <p:to>
+                                        <p:strVal val="visible"/>
+                                      </p:to>
+                                    </p:set>
+                                  </p:childTnLst>
+                                </p:cTn>
+                              </p:par>
+                              <p:par>
+                                <p:cTn id="23" presetID="1" presetClass="entr" presetSubtype="0" fill="hold" grpId="0" nodeType="withEffect">
+                                  <p:stCondLst>
+                                    <p:cond delay="0"/>
+                                  </p:stCondLst>
+                                  <p:childTnLst>
+                                    <p:set>
+                                      <p:cBhvr>
+                                        <p:cTn id="24" dur="1" fill="hold">
+                                          <p:stCondLst>
+                                            <p:cond delay="0"/>
+                                          </p:stCondLst>
+                                        </p:cTn>
+                                        <p:tgtEl>
+                                          <p:spTgt spid="5">
+                                            <p:txEl>
                                               <p:pRg st="5" end="5"/>
                                             </p:txEl>
                                           </p:spTgt>
@@ -4873,50 +4900,19 @@
                     </p:cTn>
                   </p:par>
                   <p:par>
-                    <p:cTn id="23" fill="hold">
+                    <p:cTn id="25" fill="hold">
                       <p:stCondLst>
                         <p:cond delay="indefinite"/>
                       </p:stCondLst>
                       <p:childTnLst>
                         <p:par>
-                          <p:cTn id="24" fill="hold">
+                          <p:cTn id="26" fill="hold">
                             <p:stCondLst>
                               <p:cond delay="0"/>
                             </p:stCondLst>
                             <p:childTnLst>
                               <p:par>
-                                <p:cTn id="25" presetID="1" presetClass="entr" presetSubtype="0" fill="hold" grpId="0" nodeType="clickEffect">
-                                  <p:stCondLst>
-                                    <p:cond delay="0"/>
-                                  </p:stCondLst>
-                                  <p:childTnLst>
-                                    <p:set>
-                                      <p:cBhvr>
-                                        <p:cTn id="26" dur="1" fill="hold">
-                                          <p:stCondLst>
-                                            <p:cond delay="0"/>
-                                          </p:stCondLst>
-                                        </p:cTn>
-                                        <p:tgtEl>
-                                          <p:spTgt spid="5">
-                                            <p:txEl>
-                                              <p:pRg st="6" end="6"/>
-                                            </p:txEl>
-                                          </p:spTgt>
-                                        </p:tgtEl>
-                                        <p:attrNameLst>
-                                          <p:attrName>style.visibility</p:attrName>
-                                        </p:attrNameLst>
-                                      </p:cBhvr>
-                                      <p:to>
-                                        <p:strVal val="visible"/>
-                                      </p:to>
-                                    </p:set>
-                                  </p:childTnLst>
-                                </p:cTn>
-                              </p:par>
-                              <p:par>
-                                <p:cTn id="27" presetID="1" presetClass="entr" presetSubtype="0" fill="hold" grpId="0" nodeType="withEffect">
+                                <p:cTn id="27" presetID="1" presetClass="entr" presetSubtype="0" fill="hold" grpId="0" nodeType="clickEffect">
                                   <p:stCondLst>
                                     <p:cond delay="0"/>
                                   </p:stCondLst>
@@ -4931,7 +4927,7 @@
                                         <p:tgtEl>
                                           <p:spTgt spid="5">
                                             <p:txEl>
-                                              <p:pRg st="7" end="7"/>
+                                              <p:pRg st="6" end="6"/>
                                             </p:txEl>
                                           </p:spTgt>
                                         </p:tgtEl>
@@ -4962,7 +4958,7 @@
                                         <p:tgtEl>
                                           <p:spTgt spid="5">
                                             <p:txEl>
-                                              <p:pRg st="8" end="8"/>
+                                              <p:pRg st="7" end="7"/>
                                             </p:txEl>
                                           </p:spTgt>
                                         </p:tgtEl>
@@ -4986,6 +4982,37 @@
                                     <p:set>
                                       <p:cBhvr>
                                         <p:cTn id="32" dur="1" fill="hold">
+                                          <p:stCondLst>
+                                            <p:cond delay="0"/>
+                                          </p:stCondLst>
+                                        </p:cTn>
+                                        <p:tgtEl>
+                                          <p:spTgt spid="5">
+                                            <p:txEl>
+                                              <p:pRg st="8" end="8"/>
+                                            </p:txEl>
+                                          </p:spTgt>
+                                        </p:tgtEl>
+                                        <p:attrNameLst>
+                                          <p:attrName>style.visibility</p:attrName>
+                                        </p:attrNameLst>
+                                      </p:cBhvr>
+                                      <p:to>
+                                        <p:strVal val="visible"/>
+                                      </p:to>
+                                    </p:set>
+                                  </p:childTnLst>
+                                </p:cTn>
+                              </p:par>
+                              <p:par>
+                                <p:cTn id="33" presetID="1" presetClass="entr" presetSubtype="0" fill="hold" grpId="0" nodeType="withEffect">
+                                  <p:stCondLst>
+                                    <p:cond delay="0"/>
+                                  </p:stCondLst>
+                                  <p:childTnLst>
+                                    <p:set>
+                                      <p:cBhvr>
+                                        <p:cTn id="34" dur="1" fill="hold">
                                           <p:stCondLst>
                                             <p:cond delay="0"/>
                                           </p:stCondLst>
@@ -5037,6 +5064,7 @@
     </p:tnLst>
     <p:bldLst>
       <p:bldP spid="5" grpId="0" uiExpand="1" build="p"/>
+      <p:bldP spid="9" grpId="0"/>
     </p:bldLst>
   </p:timing>
 </p:sld>
@@ -5225,7 +5253,7 @@
             <a:fld id="{FCD7E7C2-4B8F-4989-ACDA-BBBEECDFB473}" type="datetime1">
               <a:rPr lang="de-DE" smtClean="0"/>
               <a:pPr/>
-              <a:t>16.06.2017</a:t>
+              <a:t>24.06.2017</a:t>
             </a:fld>
             <a:endParaRPr lang="de-DE" dirty="0"/>
           </a:p>
@@ -5346,6 +5374,178 @@
   <p:clrMapOvr>
     <a:masterClrMapping/>
   </p:clrMapOvr>
+  <p:timing>
+    <p:tnLst>
+      <p:par>
+        <p:cTn id="1" dur="indefinite" restart="never" nodeType="tmRoot">
+          <p:childTnLst>
+            <p:seq concurrent="1" nextAc="seek">
+              <p:cTn id="2" dur="indefinite" nodeType="mainSeq">
+                <p:childTnLst>
+                  <p:par>
+                    <p:cTn id="3" fill="hold">
+                      <p:stCondLst>
+                        <p:cond delay="indefinite"/>
+                      </p:stCondLst>
+                      <p:childTnLst>
+                        <p:par>
+                          <p:cTn id="4" fill="hold">
+                            <p:stCondLst>
+                              <p:cond delay="0"/>
+                            </p:stCondLst>
+                            <p:childTnLst>
+                              <p:par>
+                                <p:cTn id="5" presetID="1" presetClass="entr" presetSubtype="0" fill="hold" nodeType="clickEffect">
+                                  <p:stCondLst>
+                                    <p:cond delay="0"/>
+                                  </p:stCondLst>
+                                  <p:childTnLst>
+                                    <p:set>
+                                      <p:cBhvr>
+                                        <p:cTn id="6" dur="1" fill="hold">
+                                          <p:stCondLst>
+                                            <p:cond delay="0"/>
+                                          </p:stCondLst>
+                                        </p:cTn>
+                                        <p:tgtEl>
+                                          <p:spTgt spid="3">
+                                            <p:txEl>
+                                              <p:pRg st="6" end="6"/>
+                                            </p:txEl>
+                                          </p:spTgt>
+                                        </p:tgtEl>
+                                        <p:attrNameLst>
+                                          <p:attrName>style.visibility</p:attrName>
+                                        </p:attrNameLst>
+                                      </p:cBhvr>
+                                      <p:to>
+                                        <p:strVal val="visible"/>
+                                      </p:to>
+                                    </p:set>
+                                  </p:childTnLst>
+                                </p:cTn>
+                              </p:par>
+                              <p:par>
+                                <p:cTn id="7" presetID="1" presetClass="entr" presetSubtype="0" fill="hold" nodeType="withEffect">
+                                  <p:stCondLst>
+                                    <p:cond delay="0"/>
+                                  </p:stCondLst>
+                                  <p:childTnLst>
+                                    <p:set>
+                                      <p:cBhvr>
+                                        <p:cTn id="8" dur="1" fill="hold">
+                                          <p:stCondLst>
+                                            <p:cond delay="0"/>
+                                          </p:stCondLst>
+                                        </p:cTn>
+                                        <p:tgtEl>
+                                          <p:spTgt spid="3">
+                                            <p:txEl>
+                                              <p:pRg st="7" end="7"/>
+                                            </p:txEl>
+                                          </p:spTgt>
+                                        </p:tgtEl>
+                                        <p:attrNameLst>
+                                          <p:attrName>style.visibility</p:attrName>
+                                        </p:attrNameLst>
+                                      </p:cBhvr>
+                                      <p:to>
+                                        <p:strVal val="visible"/>
+                                      </p:to>
+                                    </p:set>
+                                  </p:childTnLst>
+                                </p:cTn>
+                              </p:par>
+                              <p:par>
+                                <p:cTn id="9" presetID="1" presetClass="entr" presetSubtype="0" fill="hold" nodeType="withEffect">
+                                  <p:stCondLst>
+                                    <p:cond delay="0"/>
+                                  </p:stCondLst>
+                                  <p:childTnLst>
+                                    <p:set>
+                                      <p:cBhvr>
+                                        <p:cTn id="10" dur="1" fill="hold">
+                                          <p:stCondLst>
+                                            <p:cond delay="0"/>
+                                          </p:stCondLst>
+                                        </p:cTn>
+                                        <p:tgtEl>
+                                          <p:spTgt spid="3">
+                                            <p:txEl>
+                                              <p:pRg st="8" end="8"/>
+                                            </p:txEl>
+                                          </p:spTgt>
+                                        </p:tgtEl>
+                                        <p:attrNameLst>
+                                          <p:attrName>style.visibility</p:attrName>
+                                        </p:attrNameLst>
+                                      </p:cBhvr>
+                                      <p:to>
+                                        <p:strVal val="visible"/>
+                                      </p:to>
+                                    </p:set>
+                                  </p:childTnLst>
+                                </p:cTn>
+                              </p:par>
+                              <p:par>
+                                <p:cTn id="11" presetID="1" presetClass="entr" presetSubtype="0" fill="hold" nodeType="withEffect">
+                                  <p:stCondLst>
+                                    <p:cond delay="0"/>
+                                  </p:stCondLst>
+                                  <p:childTnLst>
+                                    <p:set>
+                                      <p:cBhvr>
+                                        <p:cTn id="12" dur="1" fill="hold">
+                                          <p:stCondLst>
+                                            <p:cond delay="0"/>
+                                          </p:stCondLst>
+                                        </p:cTn>
+                                        <p:tgtEl>
+                                          <p:spTgt spid="3">
+                                            <p:txEl>
+                                              <p:pRg st="9" end="9"/>
+                                            </p:txEl>
+                                          </p:spTgt>
+                                        </p:tgtEl>
+                                        <p:attrNameLst>
+                                          <p:attrName>style.visibility</p:attrName>
+                                        </p:attrNameLst>
+                                      </p:cBhvr>
+                                      <p:to>
+                                        <p:strVal val="visible"/>
+                                      </p:to>
+                                    </p:set>
+                                  </p:childTnLst>
+                                </p:cTn>
+                              </p:par>
+                            </p:childTnLst>
+                          </p:cTn>
+                        </p:par>
+                      </p:childTnLst>
+                    </p:cTn>
+                  </p:par>
+                </p:childTnLst>
+              </p:cTn>
+              <p:prevCondLst>
+                <p:cond evt="onPrev" delay="0">
+                  <p:tgtEl>
+                    <p:sldTgt/>
+                  </p:tgtEl>
+                </p:cond>
+              </p:prevCondLst>
+              <p:nextCondLst>
+                <p:cond evt="onNext" delay="0">
+                  <p:tgtEl>
+                    <p:sldTgt/>
+                  </p:tgtEl>
+                </p:cond>
+              </p:nextCondLst>
+            </p:seq>
+          </p:childTnLst>
+        </p:cTn>
+      </p:par>
+    </p:tnLst>
+  </p:timing>
 </p:sld>
 </file>
 
@@ -5479,7 +5679,7 @@
             <a:fld id="{FCD7E7C2-4B8F-4989-ACDA-BBBEECDFB473}" type="datetime1">
               <a:rPr lang="de-DE" smtClean="0"/>
               <a:pPr/>
-              <a:t>17.06.2017</a:t>
+              <a:t>24.06.2017</a:t>
             </a:fld>
             <a:endParaRPr lang="de-DE" dirty="0"/>
           </a:p>
@@ -5869,6 +6069,444 @@
   <p:clrMapOvr>
     <a:masterClrMapping/>
   </p:clrMapOvr>
+  <p:timing>
+    <p:tnLst>
+      <p:par>
+        <p:cTn id="1" dur="indefinite" restart="never" nodeType="tmRoot">
+          <p:childTnLst>
+            <p:seq concurrent="1" nextAc="seek">
+              <p:cTn id="2" dur="indefinite" nodeType="mainSeq">
+                <p:childTnLst>
+                  <p:par>
+                    <p:cTn id="3" fill="hold">
+                      <p:stCondLst>
+                        <p:cond delay="indefinite"/>
+                      </p:stCondLst>
+                      <p:childTnLst>
+                        <p:par>
+                          <p:cTn id="4" fill="hold">
+                            <p:stCondLst>
+                              <p:cond delay="0"/>
+                            </p:stCondLst>
+                            <p:childTnLst>
+                              <p:par>
+                                <p:cTn id="5" presetID="1" presetClass="entr" presetSubtype="0" fill="hold" nodeType="clickEffect">
+                                  <p:stCondLst>
+                                    <p:cond delay="0"/>
+                                  </p:stCondLst>
+                                  <p:childTnLst>
+                                    <p:set>
+                                      <p:cBhvr>
+                                        <p:cTn id="6" dur="1" fill="hold">
+                                          <p:stCondLst>
+                                            <p:cond delay="0"/>
+                                          </p:stCondLst>
+                                        </p:cTn>
+                                        <p:tgtEl>
+                                          <p:spTgt spid="7">
+                                            <p:txEl>
+                                              <p:pRg st="4" end="4"/>
+                                            </p:txEl>
+                                          </p:spTgt>
+                                        </p:tgtEl>
+                                        <p:attrNameLst>
+                                          <p:attrName>style.visibility</p:attrName>
+                                        </p:attrNameLst>
+                                      </p:cBhvr>
+                                      <p:to>
+                                        <p:strVal val="visible"/>
+                                      </p:to>
+                                    </p:set>
+                                  </p:childTnLst>
+                                </p:cTn>
+                              </p:par>
+                              <p:par>
+                                <p:cTn id="7" presetID="1" presetClass="entr" presetSubtype="0" fill="hold" nodeType="withEffect">
+                                  <p:stCondLst>
+                                    <p:cond delay="0"/>
+                                  </p:stCondLst>
+                                  <p:childTnLst>
+                                    <p:set>
+                                      <p:cBhvr>
+                                        <p:cTn id="8" dur="1" fill="hold">
+                                          <p:stCondLst>
+                                            <p:cond delay="0"/>
+                                          </p:stCondLst>
+                                        </p:cTn>
+                                        <p:tgtEl>
+                                          <p:spTgt spid="7">
+                                            <p:txEl>
+                                              <p:pRg st="5" end="5"/>
+                                            </p:txEl>
+                                          </p:spTgt>
+                                        </p:tgtEl>
+                                        <p:attrNameLst>
+                                          <p:attrName>style.visibility</p:attrName>
+                                        </p:attrNameLst>
+                                      </p:cBhvr>
+                                      <p:to>
+                                        <p:strVal val="visible"/>
+                                      </p:to>
+                                    </p:set>
+                                  </p:childTnLst>
+                                </p:cTn>
+                              </p:par>
+                              <p:par>
+                                <p:cTn id="9" presetID="1" presetClass="entr" presetSubtype="0" fill="hold" nodeType="withEffect">
+                                  <p:stCondLst>
+                                    <p:cond delay="0"/>
+                                  </p:stCondLst>
+                                  <p:childTnLst>
+                                    <p:set>
+                                      <p:cBhvr>
+                                        <p:cTn id="10" dur="1" fill="hold">
+                                          <p:stCondLst>
+                                            <p:cond delay="0"/>
+                                          </p:stCondLst>
+                                        </p:cTn>
+                                        <p:tgtEl>
+                                          <p:spTgt spid="7">
+                                            <p:txEl>
+                                              <p:pRg st="6" end="6"/>
+                                            </p:txEl>
+                                          </p:spTgt>
+                                        </p:tgtEl>
+                                        <p:attrNameLst>
+                                          <p:attrName>style.visibility</p:attrName>
+                                        </p:attrNameLst>
+                                      </p:cBhvr>
+                                      <p:to>
+                                        <p:strVal val="visible"/>
+                                      </p:to>
+                                    </p:set>
+                                  </p:childTnLst>
+                                </p:cTn>
+                              </p:par>
+                              <p:par>
+                                <p:cTn id="11" presetID="1" presetClass="entr" presetSubtype="0" fill="hold" nodeType="withEffect">
+                                  <p:stCondLst>
+                                    <p:cond delay="0"/>
+                                  </p:stCondLst>
+                                  <p:childTnLst>
+                                    <p:set>
+                                      <p:cBhvr>
+                                        <p:cTn id="12" dur="1" fill="hold">
+                                          <p:stCondLst>
+                                            <p:cond delay="0"/>
+                                          </p:stCondLst>
+                                        </p:cTn>
+                                        <p:tgtEl>
+                                          <p:spTgt spid="7">
+                                            <p:txEl>
+                                              <p:pRg st="7" end="7"/>
+                                            </p:txEl>
+                                          </p:spTgt>
+                                        </p:tgtEl>
+                                        <p:attrNameLst>
+                                          <p:attrName>style.visibility</p:attrName>
+                                        </p:attrNameLst>
+                                      </p:cBhvr>
+                                      <p:to>
+                                        <p:strVal val="visible"/>
+                                      </p:to>
+                                    </p:set>
+                                  </p:childTnLst>
+                                </p:cTn>
+                              </p:par>
+                              <p:par>
+                                <p:cTn id="13" presetID="1" presetClass="entr" presetSubtype="0" fill="hold" nodeType="withEffect">
+                                  <p:stCondLst>
+                                    <p:cond delay="0"/>
+                                  </p:stCondLst>
+                                  <p:childTnLst>
+                                    <p:set>
+                                      <p:cBhvr>
+                                        <p:cTn id="14" dur="1" fill="hold">
+                                          <p:stCondLst>
+                                            <p:cond delay="0"/>
+                                          </p:stCondLst>
+                                        </p:cTn>
+                                        <p:tgtEl>
+                                          <p:spTgt spid="7">
+                                            <p:txEl>
+                                              <p:pRg st="8" end="8"/>
+                                            </p:txEl>
+                                          </p:spTgt>
+                                        </p:tgtEl>
+                                        <p:attrNameLst>
+                                          <p:attrName>style.visibility</p:attrName>
+                                        </p:attrNameLst>
+                                      </p:cBhvr>
+                                      <p:to>
+                                        <p:strVal val="visible"/>
+                                      </p:to>
+                                    </p:set>
+                                  </p:childTnLst>
+                                </p:cTn>
+                              </p:par>
+                              <p:par>
+                                <p:cTn id="15" presetID="1" presetClass="entr" presetSubtype="0" fill="hold" nodeType="withEffect">
+                                  <p:stCondLst>
+                                    <p:cond delay="0"/>
+                                  </p:stCondLst>
+                                  <p:childTnLst>
+                                    <p:set>
+                                      <p:cBhvr>
+                                        <p:cTn id="16" dur="1" fill="hold">
+                                          <p:stCondLst>
+                                            <p:cond delay="0"/>
+                                          </p:stCondLst>
+                                        </p:cTn>
+                                        <p:tgtEl>
+                                          <p:spTgt spid="7">
+                                            <p:txEl>
+                                              <p:pRg st="9" end="9"/>
+                                            </p:txEl>
+                                          </p:spTgt>
+                                        </p:tgtEl>
+                                        <p:attrNameLst>
+                                          <p:attrName>style.visibility</p:attrName>
+                                        </p:attrNameLst>
+                                      </p:cBhvr>
+                                      <p:to>
+                                        <p:strVal val="visible"/>
+                                      </p:to>
+                                    </p:set>
+                                  </p:childTnLst>
+                                </p:cTn>
+                              </p:par>
+                            </p:childTnLst>
+                          </p:cTn>
+                        </p:par>
+                      </p:childTnLst>
+                    </p:cTn>
+                  </p:par>
+                  <p:par>
+                    <p:cTn id="17" fill="hold">
+                      <p:stCondLst>
+                        <p:cond delay="indefinite"/>
+                      </p:stCondLst>
+                      <p:childTnLst>
+                        <p:par>
+                          <p:cTn id="18" fill="hold">
+                            <p:stCondLst>
+                              <p:cond delay="0"/>
+                            </p:stCondLst>
+                            <p:childTnLst>
+                              <p:par>
+                                <p:cTn id="19" presetID="1" presetClass="entr" presetSubtype="0" fill="hold" nodeType="clickEffect">
+                                  <p:stCondLst>
+                                    <p:cond delay="0"/>
+                                  </p:stCondLst>
+                                  <p:childTnLst>
+                                    <p:set>
+                                      <p:cBhvr>
+                                        <p:cTn id="20" dur="1" fill="hold">
+                                          <p:stCondLst>
+                                            <p:cond delay="0"/>
+                                          </p:stCondLst>
+                                        </p:cTn>
+                                        <p:tgtEl>
+                                          <p:spTgt spid="3">
+                                            <p:txEl>
+                                              <p:pRg st="0" end="0"/>
+                                            </p:txEl>
+                                          </p:spTgt>
+                                        </p:tgtEl>
+                                        <p:attrNameLst>
+                                          <p:attrName>style.visibility</p:attrName>
+                                        </p:attrNameLst>
+                                      </p:cBhvr>
+                                      <p:to>
+                                        <p:strVal val="visible"/>
+                                      </p:to>
+                                    </p:set>
+                                  </p:childTnLst>
+                                </p:cTn>
+                              </p:par>
+                              <p:par>
+                                <p:cTn id="21" presetID="1" presetClass="entr" presetSubtype="0" fill="hold" nodeType="withEffect">
+                                  <p:stCondLst>
+                                    <p:cond delay="0"/>
+                                  </p:stCondLst>
+                                  <p:childTnLst>
+                                    <p:set>
+                                      <p:cBhvr>
+                                        <p:cTn id="22" dur="1" fill="hold">
+                                          <p:stCondLst>
+                                            <p:cond delay="0"/>
+                                          </p:stCondLst>
+                                        </p:cTn>
+                                        <p:tgtEl>
+                                          <p:spTgt spid="3">
+                                            <p:txEl>
+                                              <p:pRg st="1" end="1"/>
+                                            </p:txEl>
+                                          </p:spTgt>
+                                        </p:tgtEl>
+                                        <p:attrNameLst>
+                                          <p:attrName>style.visibility</p:attrName>
+                                        </p:attrNameLst>
+                                      </p:cBhvr>
+                                      <p:to>
+                                        <p:strVal val="visible"/>
+                                      </p:to>
+                                    </p:set>
+                                  </p:childTnLst>
+                                </p:cTn>
+                              </p:par>
+                              <p:par>
+                                <p:cTn id="23" presetID="1" presetClass="entr" presetSubtype="0" fill="hold" nodeType="withEffect">
+                                  <p:stCondLst>
+                                    <p:cond delay="0"/>
+                                  </p:stCondLst>
+                                  <p:childTnLst>
+                                    <p:set>
+                                      <p:cBhvr>
+                                        <p:cTn id="24" dur="1" fill="hold">
+                                          <p:stCondLst>
+                                            <p:cond delay="0"/>
+                                          </p:stCondLst>
+                                        </p:cTn>
+                                        <p:tgtEl>
+                                          <p:spTgt spid="3">
+                                            <p:txEl>
+                                              <p:pRg st="2" end="2"/>
+                                            </p:txEl>
+                                          </p:spTgt>
+                                        </p:tgtEl>
+                                        <p:attrNameLst>
+                                          <p:attrName>style.visibility</p:attrName>
+                                        </p:attrNameLst>
+                                      </p:cBhvr>
+                                      <p:to>
+                                        <p:strVal val="visible"/>
+                                      </p:to>
+                                    </p:set>
+                                  </p:childTnLst>
+                                </p:cTn>
+                              </p:par>
+                              <p:par>
+                                <p:cTn id="25" presetID="1" presetClass="entr" presetSubtype="0" fill="hold" nodeType="withEffect">
+                                  <p:stCondLst>
+                                    <p:cond delay="0"/>
+                                  </p:stCondLst>
+                                  <p:childTnLst>
+                                    <p:set>
+                                      <p:cBhvr>
+                                        <p:cTn id="26" dur="1" fill="hold">
+                                          <p:stCondLst>
+                                            <p:cond delay="0"/>
+                                          </p:stCondLst>
+                                        </p:cTn>
+                                        <p:tgtEl>
+                                          <p:spTgt spid="3">
+                                            <p:txEl>
+                                              <p:pRg st="3" end="3"/>
+                                            </p:txEl>
+                                          </p:spTgt>
+                                        </p:tgtEl>
+                                        <p:attrNameLst>
+                                          <p:attrName>style.visibility</p:attrName>
+                                        </p:attrNameLst>
+                                      </p:cBhvr>
+                                      <p:to>
+                                        <p:strVal val="visible"/>
+                                      </p:to>
+                                    </p:set>
+                                  </p:childTnLst>
+                                </p:cTn>
+                              </p:par>
+                              <p:par>
+                                <p:cTn id="27" presetID="1" presetClass="entr" presetSubtype="0" fill="hold" nodeType="withEffect">
+                                  <p:stCondLst>
+                                    <p:cond delay="0"/>
+                                  </p:stCondLst>
+                                  <p:childTnLst>
+                                    <p:set>
+                                      <p:cBhvr>
+                                        <p:cTn id="28" dur="1" fill="hold">
+                                          <p:stCondLst>
+                                            <p:cond delay="0"/>
+                                          </p:stCondLst>
+                                        </p:cTn>
+                                        <p:tgtEl>
+                                          <p:spTgt spid="3">
+                                            <p:txEl>
+                                              <p:pRg st="4" end="4"/>
+                                            </p:txEl>
+                                          </p:spTgt>
+                                        </p:tgtEl>
+                                        <p:attrNameLst>
+                                          <p:attrName>style.visibility</p:attrName>
+                                        </p:attrNameLst>
+                                      </p:cBhvr>
+                                      <p:to>
+                                        <p:strVal val="visible"/>
+                                      </p:to>
+                                    </p:set>
+                                  </p:childTnLst>
+                                </p:cTn>
+                              </p:par>
+                              <p:par>
+                                <p:cTn id="29" presetID="1" presetClass="entr" presetSubtype="0" fill="hold" nodeType="withEffect">
+                                  <p:stCondLst>
+                                    <p:cond delay="0"/>
+                                  </p:stCondLst>
+                                  <p:childTnLst>
+                                    <p:set>
+                                      <p:cBhvr>
+                                        <p:cTn id="30" dur="1" fill="hold">
+                                          <p:stCondLst>
+                                            <p:cond delay="0"/>
+                                          </p:stCondLst>
+                                        </p:cTn>
+                                        <p:tgtEl>
+                                          <p:spTgt spid="3">
+                                            <p:txEl>
+                                              <p:pRg st="5" end="5"/>
+                                            </p:txEl>
+                                          </p:spTgt>
+                                        </p:tgtEl>
+                                        <p:attrNameLst>
+                                          <p:attrName>style.visibility</p:attrName>
+                                        </p:attrNameLst>
+                                      </p:cBhvr>
+                                      <p:to>
+                                        <p:strVal val="visible"/>
+                                      </p:to>
+                                    </p:set>
+                                  </p:childTnLst>
+                                </p:cTn>
+                              </p:par>
+                            </p:childTnLst>
+                          </p:cTn>
+                        </p:par>
+                      </p:childTnLst>
+                    </p:cTn>
+                  </p:par>
+                </p:childTnLst>
+              </p:cTn>
+              <p:prevCondLst>
+                <p:cond evt="onPrev" delay="0">
+                  <p:tgtEl>
+                    <p:sldTgt/>
+                  </p:tgtEl>
+                </p:cond>
+              </p:prevCondLst>
+              <p:nextCondLst>
+                <p:cond evt="onNext" delay="0">
+                  <p:tgtEl>
+                    <p:sldTgt/>
+                  </p:tgtEl>
+                </p:cond>
+              </p:nextCondLst>
+            </p:seq>
+          </p:childTnLst>
+        </p:cTn>
+      </p:par>
+    </p:tnLst>
+  </p:timing>
 </p:sld>
 </file>
 
@@ -6031,7 +6669,7 @@
             <a:fld id="{FCD7E7C2-4B8F-4989-ACDA-BBBEECDFB473}" type="datetime1">
               <a:rPr lang="de-DE" smtClean="0"/>
               <a:pPr/>
-              <a:t>16.06.2017</a:t>
+              <a:t>24.06.2017</a:t>
             </a:fld>
             <a:endParaRPr lang="de-DE" dirty="0"/>
           </a:p>
@@ -6640,6 +7278,57 @@
           </a:p>
         </p:txBody>
       </p:sp>
+      <p:sp>
+        <p:nvSpPr>
+          <p:cNvPr id="2" name="Rectangle 1">
+            <a:extLst>
+              <a:ext uri="{FF2B5EF4-FFF2-40B4-BE49-F238E27FC236}">
+                <a16:creationId xmlns:a16="http://schemas.microsoft.com/office/drawing/2014/main" id="{B5BE0E51-B54E-46AC-9F97-4A49F25CAE19}"/>
+              </a:ext>
+            </a:extLst>
+          </p:cNvPr>
+          <p:cNvSpPr/>
+          <p:nvPr/>
+        </p:nvSpPr>
+        <p:spPr>
+          <a:xfrm>
+            <a:off x="0" y="-17254"/>
+            <a:ext cx="12192000" cy="6875253"/>
+          </a:xfrm>
+          <a:prstGeom prst="rect">
+            <a:avLst/>
+          </a:prstGeom>
+          <a:ln>
+            <a:solidFill>
+              <a:srgbClr val="434848"/>
+            </a:solidFill>
+          </a:ln>
+        </p:spPr>
+        <p:style>
+          <a:lnRef idx="2">
+            <a:schemeClr val="dk1">
+              <a:shade val="50000"/>
+            </a:schemeClr>
+          </a:lnRef>
+          <a:fillRef idx="1">
+            <a:schemeClr val="dk1"/>
+          </a:fillRef>
+          <a:effectRef idx="0">
+            <a:schemeClr val="dk1"/>
+          </a:effectRef>
+          <a:fontRef idx="minor">
+            <a:schemeClr val="lt1"/>
+          </a:fontRef>
+        </p:style>
+        <p:txBody>
+          <a:bodyPr rtlCol="0" anchor="ctr"/>
+          <a:lstStyle/>
+          <a:p>
+            <a:pPr algn="ctr"/>
+            <a:endParaRPr lang="de-DE"/>
+          </a:p>
+        </p:txBody>
+      </p:sp>
     </p:spTree>
     <p:extLst>
       <p:ext uri="{BB962C8B-B14F-4D97-AF65-F5344CB8AC3E}">
@@ -7952,7 +8641,7 @@
             <a:fld id="{FCD7E7C2-4B8F-4989-ACDA-BBBEECDFB473}" type="datetime1">
               <a:rPr lang="de-DE" smtClean="0"/>
               <a:pPr/>
-              <a:t>16.06.2017</a:t>
+              <a:t>24.06.2017</a:t>
             </a:fld>
             <a:endParaRPr lang="de-DE" dirty="0"/>
           </a:p>
@@ -8730,7 +9419,7 @@
             <a:fld id="{FCD7E7C2-4B8F-4989-ACDA-BBBEECDFB473}" type="datetime1">
               <a:rPr lang="de-DE" smtClean="0"/>
               <a:pPr/>
-              <a:t>16.06.2017</a:t>
+              <a:t>24.06.2017</a:t>
             </a:fld>
             <a:endParaRPr lang="de-DE" dirty="0"/>
           </a:p>
@@ -9228,7 +9917,7 @@
           <a:p>
             <a:fld id="{0DCD4440-A392-468D-9172-BE099E311DC2}" type="datetime1">
               <a:rPr lang="de-DE" smtClean="0"/>
-              <a:t>16.06.2017</a:t>
+              <a:t>24.06.2017</a:t>
             </a:fld>
             <a:endParaRPr lang="de-DE" dirty="0"/>
           </a:p>
@@ -9409,7 +10098,7 @@
             <a:fld id="{FCD7E7C2-4B8F-4989-ACDA-BBBEECDFB473}" type="datetime1">
               <a:rPr lang="de-DE" smtClean="0"/>
               <a:pPr/>
-              <a:t>16.06.2017</a:t>
+              <a:t>24.06.2017</a:t>
             </a:fld>
             <a:endParaRPr lang="de-DE" dirty="0"/>
           </a:p>
@@ -9929,7 +10618,7 @@
           <a:p>
             <a:fld id="{FCD7E7C2-4B8F-4989-ACDA-BBBEECDFB473}" type="datetime1">
               <a:rPr lang="de-DE" smtClean="0"/>
-              <a:t>16.06.2017</a:t>
+              <a:t>24.06.2017</a:t>
             </a:fld>
             <a:endParaRPr lang="de-DE" dirty="0"/>
           </a:p>
@@ -9990,744 +10679,6 @@
           </a:p>
         </p:txBody>
       </p:sp>
-      <p:grpSp>
-        <p:nvGrpSpPr>
-          <p:cNvPr id="7" name="Group 6"/>
-          <p:cNvGrpSpPr/>
-          <p:nvPr/>
-        </p:nvGrpSpPr>
-        <p:grpSpPr>
-          <a:xfrm>
-            <a:off x="7274957" y="2163149"/>
-            <a:ext cx="3214370" cy="2735672"/>
-            <a:chOff x="2590972" y="2239375"/>
-            <a:chExt cx="3214370" cy="2735672"/>
-          </a:xfrm>
-        </p:grpSpPr>
-        <p:sp>
-          <p:nvSpPr>
-            <p:cNvPr id="12" name="Text Box 1"/>
-            <p:cNvSpPr txBox="1"/>
-            <p:nvPr/>
-          </p:nvSpPr>
-          <p:spPr>
-            <a:xfrm>
-              <a:off x="2590972" y="2239375"/>
-              <a:ext cx="3214370" cy="819150"/>
-            </a:xfrm>
-            <a:prstGeom prst="rect">
-              <a:avLst/>
-            </a:prstGeom>
-            <a:solidFill>
-              <a:srgbClr val="434848"/>
-            </a:solidFill>
-            <a:ln w="12700">
-              <a:solidFill>
-                <a:prstClr val="black"/>
-              </a:solidFill>
-            </a:ln>
-          </p:spPr>
-          <p:txBody>
-            <a:bodyPr rot="0" spcFirstLastPara="0" vert="horz" wrap="square" lIns="91440" tIns="45720" rIns="91440" bIns="45720" numCol="1" spcCol="0" rtlCol="0" fromWordArt="0" anchor="t" anchorCtr="0" forceAA="0" compatLnSpc="1">
-              <a:prstTxWarp prst="textNoShape">
-                <a:avLst/>
-              </a:prstTxWarp>
-              <a:noAutofit/>
-            </a:bodyPr>
-            <a:lstStyle/>
-            <a:p>
-              <a:pPr algn="ctr">
-                <a:lnSpc>
-                  <a:spcPct val="107000"/>
-                </a:lnSpc>
-                <a:spcAft>
-                  <a:spcPts val="800"/>
-                </a:spcAft>
-              </a:pPr>
-              <a:r>
-                <a:rPr lang="en-US" dirty="0" err="1">
-                  <a:solidFill>
-                    <a:srgbClr val="F6F8FA"/>
-                  </a:solidFill>
-                  <a:effectLst/>
-                  <a:latin typeface="Calibri" panose="020F0502020204030204" pitchFamily="34" charset="0"/>
-                  <a:ea typeface="Calibri" panose="020F0502020204030204" pitchFamily="34" charset="0"/>
-                  <a:cs typeface="Times New Roman" panose="02020603050405020304" pitchFamily="18" charset="0"/>
-                </a:rPr>
-                <a:t>Präsentation</a:t>
-              </a:r>
-              <a:endParaRPr lang="de-DE" sz="1100" dirty="0">
-                <a:solidFill>
-                  <a:srgbClr val="F6F8FA"/>
-                </a:solidFill>
-                <a:effectLst/>
-                <a:latin typeface="Calibri" panose="020F0502020204030204" pitchFamily="34" charset="0"/>
-                <a:ea typeface="Calibri" panose="020F0502020204030204" pitchFamily="34" charset="0"/>
-                <a:cs typeface="Times New Roman" panose="02020603050405020304" pitchFamily="18" charset="0"/>
-              </a:endParaRPr>
-            </a:p>
-          </p:txBody>
-        </p:sp>
-        <p:sp>
-          <p:nvSpPr>
-            <p:cNvPr id="13" name="Text Box 2"/>
-            <p:cNvSpPr txBox="1"/>
-            <p:nvPr/>
-          </p:nvSpPr>
-          <p:spPr>
-            <a:xfrm>
-              <a:off x="2719546" y="2615613"/>
-              <a:ext cx="947327" cy="304800"/>
-            </a:xfrm>
-            <a:prstGeom prst="rect">
-              <a:avLst/>
-            </a:prstGeom>
-            <a:solidFill>
-              <a:schemeClr val="accent1">
-                <a:lumMod val="60000"/>
-                <a:lumOff val="40000"/>
-              </a:schemeClr>
-            </a:solidFill>
-            <a:ln w="6350">
-              <a:noFill/>
-            </a:ln>
-          </p:spPr>
-          <p:txBody>
-            <a:bodyPr rot="0" spcFirstLastPara="0" vert="horz" wrap="square" lIns="91440" tIns="45720" rIns="91440" bIns="45720" numCol="1" spcCol="0" rtlCol="0" fromWordArt="0" anchor="t" anchorCtr="0" forceAA="0" compatLnSpc="1">
-              <a:prstTxWarp prst="textNoShape">
-                <a:avLst/>
-              </a:prstTxWarp>
-              <a:noAutofit/>
-            </a:bodyPr>
-            <a:lstStyle/>
-            <a:p>
-              <a:pPr algn="ctr">
-                <a:lnSpc>
-                  <a:spcPct val="107000"/>
-                </a:lnSpc>
-                <a:spcAft>
-                  <a:spcPts val="800"/>
-                </a:spcAft>
-              </a:pPr>
-              <a:r>
-                <a:rPr lang="en-US" sz="1400" dirty="0">
-                  <a:effectLst/>
-                  <a:latin typeface="Calibri" panose="020F0502020204030204" pitchFamily="34" charset="0"/>
-                  <a:ea typeface="Calibri" panose="020F0502020204030204" pitchFamily="34" charset="0"/>
-                  <a:cs typeface="Times New Roman" panose="02020603050405020304" pitchFamily="18" charset="0"/>
-                </a:rPr>
-                <a:t>Lager</a:t>
-              </a:r>
-              <a:endParaRPr lang="de-DE" sz="1400" dirty="0">
-                <a:effectLst/>
-                <a:latin typeface="Calibri" panose="020F0502020204030204" pitchFamily="34" charset="0"/>
-                <a:ea typeface="Calibri" panose="020F0502020204030204" pitchFamily="34" charset="0"/>
-                <a:cs typeface="Times New Roman" panose="02020603050405020304" pitchFamily="18" charset="0"/>
-              </a:endParaRPr>
-            </a:p>
-          </p:txBody>
-        </p:sp>
-        <p:sp>
-          <p:nvSpPr>
-            <p:cNvPr id="14" name="Text Box 3"/>
-            <p:cNvSpPr txBox="1"/>
-            <p:nvPr/>
-          </p:nvSpPr>
-          <p:spPr>
-            <a:xfrm>
-              <a:off x="3729097" y="2615613"/>
-              <a:ext cx="947645" cy="306000"/>
-            </a:xfrm>
-            <a:prstGeom prst="rect">
-              <a:avLst/>
-            </a:prstGeom>
-            <a:solidFill>
-              <a:schemeClr val="accent2">
-                <a:lumMod val="60000"/>
-                <a:lumOff val="40000"/>
-              </a:schemeClr>
-            </a:solidFill>
-            <a:ln w="6350">
-              <a:noFill/>
-            </a:ln>
-          </p:spPr>
-          <p:txBody>
-            <a:bodyPr rot="0" spcFirstLastPara="0" vert="horz" wrap="square" lIns="91440" tIns="45720" rIns="91440" bIns="45720" numCol="1" spcCol="0" rtlCol="0" fromWordArt="0" anchor="t" anchorCtr="0" forceAA="0" compatLnSpc="1">
-              <a:prstTxWarp prst="textNoShape">
-                <a:avLst/>
-              </a:prstTxWarp>
-              <a:noAutofit/>
-            </a:bodyPr>
-            <a:lstStyle/>
-            <a:p>
-              <a:pPr algn="ctr">
-                <a:lnSpc>
-                  <a:spcPct val="107000"/>
-                </a:lnSpc>
-                <a:spcAft>
-                  <a:spcPts val="800"/>
-                </a:spcAft>
-              </a:pPr>
-              <a:r>
-                <a:rPr lang="en-US" sz="1400">
-                  <a:effectLst/>
-                  <a:latin typeface="Calibri" panose="020F0502020204030204" pitchFamily="34" charset="0"/>
-                  <a:ea typeface="Calibri" panose="020F0502020204030204" pitchFamily="34" charset="0"/>
-                  <a:cs typeface="Times New Roman" panose="02020603050405020304" pitchFamily="18" charset="0"/>
-                </a:rPr>
-                <a:t>Verkauf</a:t>
-              </a:r>
-              <a:endParaRPr lang="de-DE" sz="1400">
-                <a:effectLst/>
-                <a:latin typeface="Calibri" panose="020F0502020204030204" pitchFamily="34" charset="0"/>
-                <a:ea typeface="Calibri" panose="020F0502020204030204" pitchFamily="34" charset="0"/>
-                <a:cs typeface="Times New Roman" panose="02020603050405020304" pitchFamily="18" charset="0"/>
-              </a:endParaRPr>
-            </a:p>
-          </p:txBody>
-        </p:sp>
-        <p:sp>
-          <p:nvSpPr>
-            <p:cNvPr id="15" name="Text Box 4"/>
-            <p:cNvSpPr txBox="1"/>
-            <p:nvPr/>
-          </p:nvSpPr>
-          <p:spPr>
-            <a:xfrm>
-              <a:off x="4738647" y="2615613"/>
-              <a:ext cx="947645" cy="306000"/>
-            </a:xfrm>
-            <a:prstGeom prst="rect">
-              <a:avLst/>
-            </a:prstGeom>
-            <a:solidFill>
-              <a:schemeClr val="accent6">
-                <a:lumMod val="60000"/>
-                <a:lumOff val="40000"/>
-              </a:schemeClr>
-            </a:solidFill>
-            <a:ln w="6350">
-              <a:noFill/>
-            </a:ln>
-          </p:spPr>
-          <p:txBody>
-            <a:bodyPr rot="0" spcFirstLastPara="0" vert="horz" wrap="square" lIns="91440" tIns="45720" rIns="91440" bIns="45720" numCol="1" spcCol="0" rtlCol="0" fromWordArt="0" anchor="t" anchorCtr="0" forceAA="0" compatLnSpc="1">
-              <a:prstTxWarp prst="textNoShape">
-                <a:avLst/>
-              </a:prstTxWarp>
-              <a:noAutofit/>
-            </a:bodyPr>
-            <a:lstStyle/>
-            <a:p>
-              <a:pPr algn="ctr">
-                <a:lnSpc>
-                  <a:spcPct val="107000"/>
-                </a:lnSpc>
-                <a:spcAft>
-                  <a:spcPts val="800"/>
-                </a:spcAft>
-              </a:pPr>
-              <a:r>
-                <a:rPr lang="en-US" sz="1400" dirty="0" err="1">
-                  <a:effectLst/>
-                  <a:latin typeface="Calibri" panose="020F0502020204030204" pitchFamily="34" charset="0"/>
-                  <a:ea typeface="Calibri" panose="020F0502020204030204" pitchFamily="34" charset="0"/>
-                  <a:cs typeface="Times New Roman" panose="02020603050405020304" pitchFamily="18" charset="0"/>
-                </a:rPr>
-                <a:t>Einkauf</a:t>
-              </a:r>
-              <a:endParaRPr lang="de-DE" sz="1400" dirty="0">
-                <a:effectLst/>
-                <a:latin typeface="Calibri" panose="020F0502020204030204" pitchFamily="34" charset="0"/>
-                <a:ea typeface="Calibri" panose="020F0502020204030204" pitchFamily="34" charset="0"/>
-                <a:cs typeface="Times New Roman" panose="02020603050405020304" pitchFamily="18" charset="0"/>
-              </a:endParaRPr>
-            </a:p>
-          </p:txBody>
-        </p:sp>
-        <p:sp>
-          <p:nvSpPr>
-            <p:cNvPr id="16" name="Text Box 5"/>
-            <p:cNvSpPr txBox="1"/>
-            <p:nvPr/>
-          </p:nvSpPr>
-          <p:spPr>
-            <a:xfrm>
-              <a:off x="2590972" y="3197636"/>
-              <a:ext cx="3214053" cy="819150"/>
-            </a:xfrm>
-            <a:prstGeom prst="rect">
-              <a:avLst/>
-            </a:prstGeom>
-            <a:solidFill>
-              <a:srgbClr val="434848"/>
-            </a:solidFill>
-            <a:ln w="12700">
-              <a:solidFill>
-                <a:prstClr val="black"/>
-              </a:solidFill>
-            </a:ln>
-          </p:spPr>
-          <p:txBody>
-            <a:bodyPr rot="0" spcFirstLastPara="0" vert="horz" wrap="square" lIns="91440" tIns="45720" rIns="91440" bIns="45720" numCol="1" spcCol="0" rtlCol="0" fromWordArt="0" anchor="t" anchorCtr="0" forceAA="0" compatLnSpc="1">
-              <a:prstTxWarp prst="textNoShape">
-                <a:avLst/>
-              </a:prstTxWarp>
-              <a:noAutofit/>
-            </a:bodyPr>
-            <a:lstStyle/>
-            <a:p>
-              <a:pPr algn="ctr">
-                <a:lnSpc>
-                  <a:spcPct val="107000"/>
-                </a:lnSpc>
-                <a:spcAft>
-                  <a:spcPts val="800"/>
-                </a:spcAft>
-              </a:pPr>
-              <a:r>
-                <a:rPr lang="en-US" dirty="0" err="1">
-                  <a:solidFill>
-                    <a:srgbClr val="F6F8FA"/>
-                  </a:solidFill>
-                  <a:effectLst/>
-                  <a:latin typeface="Calibri" panose="020F0502020204030204" pitchFamily="34" charset="0"/>
-                  <a:ea typeface="Calibri" panose="020F0502020204030204" pitchFamily="34" charset="0"/>
-                  <a:cs typeface="Times New Roman" panose="02020603050405020304" pitchFamily="18" charset="0"/>
-                </a:rPr>
-                <a:t>Geschäftslogik</a:t>
-              </a:r>
-              <a:endParaRPr lang="de-DE" sz="1100" dirty="0">
-                <a:solidFill>
-                  <a:srgbClr val="F6F8FA"/>
-                </a:solidFill>
-                <a:effectLst/>
-                <a:latin typeface="Calibri" panose="020F0502020204030204" pitchFamily="34" charset="0"/>
-                <a:ea typeface="Calibri" panose="020F0502020204030204" pitchFamily="34" charset="0"/>
-                <a:cs typeface="Times New Roman" panose="02020603050405020304" pitchFamily="18" charset="0"/>
-              </a:endParaRPr>
-            </a:p>
-          </p:txBody>
-        </p:sp>
-        <p:sp>
-          <p:nvSpPr>
-            <p:cNvPr id="17" name="Text Box 6"/>
-            <p:cNvSpPr txBox="1"/>
-            <p:nvPr/>
-          </p:nvSpPr>
-          <p:spPr>
-            <a:xfrm>
-              <a:off x="2719546" y="3573874"/>
-              <a:ext cx="947327" cy="304800"/>
-            </a:xfrm>
-            <a:prstGeom prst="rect">
-              <a:avLst/>
-            </a:prstGeom>
-            <a:solidFill>
-              <a:schemeClr val="accent1">
-                <a:lumMod val="60000"/>
-                <a:lumOff val="40000"/>
-              </a:schemeClr>
-            </a:solidFill>
-            <a:ln w="6350">
-              <a:noFill/>
-            </a:ln>
-          </p:spPr>
-          <p:txBody>
-            <a:bodyPr rot="0" spcFirstLastPara="0" vert="horz" wrap="square" lIns="91440" tIns="45720" rIns="91440" bIns="45720" numCol="1" spcCol="0" rtlCol="0" fromWordArt="0" anchor="t" anchorCtr="0" forceAA="0" compatLnSpc="1">
-              <a:prstTxWarp prst="textNoShape">
-                <a:avLst/>
-              </a:prstTxWarp>
-              <a:noAutofit/>
-            </a:bodyPr>
-            <a:lstStyle/>
-            <a:p>
-              <a:pPr algn="ctr">
-                <a:lnSpc>
-                  <a:spcPct val="107000"/>
-                </a:lnSpc>
-                <a:spcAft>
-                  <a:spcPts val="800"/>
-                </a:spcAft>
-              </a:pPr>
-              <a:r>
-                <a:rPr lang="en-US" sz="1400">
-                  <a:effectLst/>
-                  <a:latin typeface="Calibri" panose="020F0502020204030204" pitchFamily="34" charset="0"/>
-                  <a:ea typeface="Calibri" panose="020F0502020204030204" pitchFamily="34" charset="0"/>
-                  <a:cs typeface="Times New Roman" panose="02020603050405020304" pitchFamily="18" charset="0"/>
-                </a:rPr>
-                <a:t>Lager</a:t>
-              </a:r>
-              <a:endParaRPr lang="de-DE" sz="1400">
-                <a:effectLst/>
-                <a:latin typeface="Calibri" panose="020F0502020204030204" pitchFamily="34" charset="0"/>
-                <a:ea typeface="Calibri" panose="020F0502020204030204" pitchFamily="34" charset="0"/>
-                <a:cs typeface="Times New Roman" panose="02020603050405020304" pitchFamily="18" charset="0"/>
-              </a:endParaRPr>
-            </a:p>
-          </p:txBody>
-        </p:sp>
-        <p:sp>
-          <p:nvSpPr>
-            <p:cNvPr id="18" name="Text Box 7"/>
-            <p:cNvSpPr txBox="1"/>
-            <p:nvPr/>
-          </p:nvSpPr>
-          <p:spPr>
-            <a:xfrm>
-              <a:off x="3729097" y="3573874"/>
-              <a:ext cx="947327" cy="305435"/>
-            </a:xfrm>
-            <a:prstGeom prst="rect">
-              <a:avLst/>
-            </a:prstGeom>
-            <a:solidFill>
-              <a:schemeClr val="accent2">
-                <a:lumMod val="60000"/>
-                <a:lumOff val="40000"/>
-              </a:schemeClr>
-            </a:solidFill>
-            <a:ln w="6350">
-              <a:noFill/>
-            </a:ln>
-          </p:spPr>
-          <p:txBody>
-            <a:bodyPr rot="0" spcFirstLastPara="0" vert="horz" wrap="square" lIns="91440" tIns="45720" rIns="91440" bIns="45720" numCol="1" spcCol="0" rtlCol="0" fromWordArt="0" anchor="t" anchorCtr="0" forceAA="0" compatLnSpc="1">
-              <a:prstTxWarp prst="textNoShape">
-                <a:avLst/>
-              </a:prstTxWarp>
-              <a:noAutofit/>
-            </a:bodyPr>
-            <a:lstStyle/>
-            <a:p>
-              <a:pPr algn="ctr">
-                <a:lnSpc>
-                  <a:spcPct val="107000"/>
-                </a:lnSpc>
-                <a:spcAft>
-                  <a:spcPts val="800"/>
-                </a:spcAft>
-              </a:pPr>
-              <a:r>
-                <a:rPr lang="en-US" sz="1400">
-                  <a:effectLst/>
-                  <a:latin typeface="Calibri" panose="020F0502020204030204" pitchFamily="34" charset="0"/>
-                  <a:ea typeface="Calibri" panose="020F0502020204030204" pitchFamily="34" charset="0"/>
-                  <a:cs typeface="Times New Roman" panose="02020603050405020304" pitchFamily="18" charset="0"/>
-                </a:rPr>
-                <a:t>Verkauf</a:t>
-              </a:r>
-              <a:endParaRPr lang="de-DE" sz="1400">
-                <a:effectLst/>
-                <a:latin typeface="Calibri" panose="020F0502020204030204" pitchFamily="34" charset="0"/>
-                <a:ea typeface="Calibri" panose="020F0502020204030204" pitchFamily="34" charset="0"/>
-                <a:cs typeface="Times New Roman" panose="02020603050405020304" pitchFamily="18" charset="0"/>
-              </a:endParaRPr>
-            </a:p>
-          </p:txBody>
-        </p:sp>
-        <p:sp>
-          <p:nvSpPr>
-            <p:cNvPr id="19" name="Text Box 8"/>
-            <p:cNvSpPr txBox="1"/>
-            <p:nvPr/>
-          </p:nvSpPr>
-          <p:spPr>
-            <a:xfrm>
-              <a:off x="4738647" y="3573874"/>
-              <a:ext cx="947327" cy="305435"/>
-            </a:xfrm>
-            <a:prstGeom prst="rect">
-              <a:avLst/>
-            </a:prstGeom>
-            <a:solidFill>
-              <a:schemeClr val="accent6">
-                <a:lumMod val="60000"/>
-                <a:lumOff val="40000"/>
-              </a:schemeClr>
-            </a:solidFill>
-            <a:ln w="6350">
-              <a:noFill/>
-            </a:ln>
-          </p:spPr>
-          <p:txBody>
-            <a:bodyPr rot="0" spcFirstLastPara="0" vert="horz" wrap="square" lIns="91440" tIns="45720" rIns="91440" bIns="45720" numCol="1" spcCol="0" rtlCol="0" fromWordArt="0" anchor="t" anchorCtr="0" forceAA="0" compatLnSpc="1">
-              <a:prstTxWarp prst="textNoShape">
-                <a:avLst/>
-              </a:prstTxWarp>
-              <a:noAutofit/>
-            </a:bodyPr>
-            <a:lstStyle/>
-            <a:p>
-              <a:pPr algn="ctr">
-                <a:lnSpc>
-                  <a:spcPct val="107000"/>
-                </a:lnSpc>
-                <a:spcAft>
-                  <a:spcPts val="800"/>
-                </a:spcAft>
-              </a:pPr>
-              <a:r>
-                <a:rPr lang="en-US" sz="1400">
-                  <a:effectLst/>
-                  <a:latin typeface="Calibri" panose="020F0502020204030204" pitchFamily="34" charset="0"/>
-                  <a:ea typeface="Calibri" panose="020F0502020204030204" pitchFamily="34" charset="0"/>
-                  <a:cs typeface="Times New Roman" panose="02020603050405020304" pitchFamily="18" charset="0"/>
-                </a:rPr>
-                <a:t>Einkauf</a:t>
-              </a:r>
-              <a:endParaRPr lang="de-DE" sz="1400">
-                <a:effectLst/>
-                <a:latin typeface="Calibri" panose="020F0502020204030204" pitchFamily="34" charset="0"/>
-                <a:ea typeface="Calibri" panose="020F0502020204030204" pitchFamily="34" charset="0"/>
-                <a:cs typeface="Times New Roman" panose="02020603050405020304" pitchFamily="18" charset="0"/>
-              </a:endParaRPr>
-            </a:p>
-          </p:txBody>
-        </p:sp>
-        <p:sp>
-          <p:nvSpPr>
-            <p:cNvPr id="20" name="Text Box 9"/>
-            <p:cNvSpPr txBox="1"/>
-            <p:nvPr/>
-          </p:nvSpPr>
-          <p:spPr>
-            <a:xfrm>
-              <a:off x="2590972" y="4155897"/>
-              <a:ext cx="3214053" cy="819150"/>
-            </a:xfrm>
-            <a:prstGeom prst="rect">
-              <a:avLst/>
-            </a:prstGeom>
-            <a:solidFill>
-              <a:srgbClr val="434848"/>
-            </a:solidFill>
-            <a:ln w="12700">
-              <a:solidFill>
-                <a:prstClr val="black"/>
-              </a:solidFill>
-            </a:ln>
-          </p:spPr>
-          <p:txBody>
-            <a:bodyPr rot="0" spcFirstLastPara="0" vert="horz" wrap="square" lIns="91440" tIns="45720" rIns="91440" bIns="45720" numCol="1" spcCol="0" rtlCol="0" fromWordArt="0" anchor="t" anchorCtr="0" forceAA="0" compatLnSpc="1">
-              <a:prstTxWarp prst="textNoShape">
-                <a:avLst/>
-              </a:prstTxWarp>
-              <a:noAutofit/>
-            </a:bodyPr>
-            <a:lstStyle/>
-            <a:p>
-              <a:pPr algn="ctr">
-                <a:lnSpc>
-                  <a:spcPct val="107000"/>
-                </a:lnSpc>
-                <a:spcAft>
-                  <a:spcPts val="800"/>
-                </a:spcAft>
-              </a:pPr>
-              <a:r>
-                <a:rPr lang="en-US" dirty="0" err="1">
-                  <a:solidFill>
-                    <a:srgbClr val="F6F8FA"/>
-                  </a:solidFill>
-                  <a:effectLst/>
-                  <a:latin typeface="Calibri" panose="020F0502020204030204" pitchFamily="34" charset="0"/>
-                  <a:ea typeface="Calibri" panose="020F0502020204030204" pitchFamily="34" charset="0"/>
-                  <a:cs typeface="Times New Roman" panose="02020603050405020304" pitchFamily="18" charset="0"/>
-                </a:rPr>
-                <a:t>Datenzugriff</a:t>
-              </a:r>
-              <a:endParaRPr lang="de-DE" sz="1100" dirty="0">
-                <a:solidFill>
-                  <a:srgbClr val="F6F8FA"/>
-                </a:solidFill>
-                <a:effectLst/>
-                <a:latin typeface="Calibri" panose="020F0502020204030204" pitchFamily="34" charset="0"/>
-                <a:ea typeface="Calibri" panose="020F0502020204030204" pitchFamily="34" charset="0"/>
-                <a:cs typeface="Times New Roman" panose="02020603050405020304" pitchFamily="18" charset="0"/>
-              </a:endParaRPr>
-            </a:p>
-          </p:txBody>
-        </p:sp>
-        <p:sp>
-          <p:nvSpPr>
-            <p:cNvPr id="21" name="Text Box 10"/>
-            <p:cNvSpPr txBox="1"/>
-            <p:nvPr/>
-          </p:nvSpPr>
-          <p:spPr>
-            <a:xfrm>
-              <a:off x="2719546" y="4532135"/>
-              <a:ext cx="947327" cy="304800"/>
-            </a:xfrm>
-            <a:prstGeom prst="rect">
-              <a:avLst/>
-            </a:prstGeom>
-            <a:solidFill>
-              <a:schemeClr val="accent1">
-                <a:lumMod val="60000"/>
-                <a:lumOff val="40000"/>
-              </a:schemeClr>
-            </a:solidFill>
-            <a:ln w="6350">
-              <a:noFill/>
-            </a:ln>
-          </p:spPr>
-          <p:txBody>
-            <a:bodyPr rot="0" spcFirstLastPara="0" vert="horz" wrap="square" lIns="91440" tIns="45720" rIns="91440" bIns="45720" numCol="1" spcCol="0" rtlCol="0" fromWordArt="0" anchor="t" anchorCtr="0" forceAA="0" compatLnSpc="1">
-              <a:prstTxWarp prst="textNoShape">
-                <a:avLst/>
-              </a:prstTxWarp>
-              <a:noAutofit/>
-            </a:bodyPr>
-            <a:lstStyle/>
-            <a:p>
-              <a:pPr algn="ctr">
-                <a:lnSpc>
-                  <a:spcPct val="107000"/>
-                </a:lnSpc>
-                <a:spcAft>
-                  <a:spcPts val="800"/>
-                </a:spcAft>
-              </a:pPr>
-              <a:r>
-                <a:rPr lang="en-US" sz="1400">
-                  <a:effectLst/>
-                  <a:latin typeface="Calibri" panose="020F0502020204030204" pitchFamily="34" charset="0"/>
-                  <a:ea typeface="Calibri" panose="020F0502020204030204" pitchFamily="34" charset="0"/>
-                  <a:cs typeface="Times New Roman" panose="02020603050405020304" pitchFamily="18" charset="0"/>
-                </a:rPr>
-                <a:t>Lager</a:t>
-              </a:r>
-              <a:endParaRPr lang="de-DE" sz="1400">
-                <a:effectLst/>
-                <a:latin typeface="Calibri" panose="020F0502020204030204" pitchFamily="34" charset="0"/>
-                <a:ea typeface="Calibri" panose="020F0502020204030204" pitchFamily="34" charset="0"/>
-                <a:cs typeface="Times New Roman" panose="02020603050405020304" pitchFamily="18" charset="0"/>
-              </a:endParaRPr>
-            </a:p>
-          </p:txBody>
-        </p:sp>
-        <p:sp>
-          <p:nvSpPr>
-            <p:cNvPr id="22" name="Text Box 11"/>
-            <p:cNvSpPr txBox="1"/>
-            <p:nvPr/>
-          </p:nvSpPr>
-          <p:spPr>
-            <a:xfrm>
-              <a:off x="3729097" y="4532135"/>
-              <a:ext cx="947327" cy="305435"/>
-            </a:xfrm>
-            <a:prstGeom prst="rect">
-              <a:avLst/>
-            </a:prstGeom>
-            <a:solidFill>
-              <a:schemeClr val="accent2">
-                <a:lumMod val="60000"/>
-                <a:lumOff val="40000"/>
-              </a:schemeClr>
-            </a:solidFill>
-            <a:ln w="6350">
-              <a:noFill/>
-            </a:ln>
-          </p:spPr>
-          <p:txBody>
-            <a:bodyPr rot="0" spcFirstLastPara="0" vert="horz" wrap="square" lIns="91440" tIns="45720" rIns="91440" bIns="45720" numCol="1" spcCol="0" rtlCol="0" fromWordArt="0" anchor="t" anchorCtr="0" forceAA="0" compatLnSpc="1">
-              <a:prstTxWarp prst="textNoShape">
-                <a:avLst/>
-              </a:prstTxWarp>
-              <a:noAutofit/>
-            </a:bodyPr>
-            <a:lstStyle/>
-            <a:p>
-              <a:pPr algn="ctr">
-                <a:lnSpc>
-                  <a:spcPct val="107000"/>
-                </a:lnSpc>
-                <a:spcAft>
-                  <a:spcPts val="800"/>
-                </a:spcAft>
-              </a:pPr>
-              <a:r>
-                <a:rPr lang="en-US" sz="1400">
-                  <a:effectLst/>
-                  <a:latin typeface="Calibri" panose="020F0502020204030204" pitchFamily="34" charset="0"/>
-                  <a:ea typeface="Calibri" panose="020F0502020204030204" pitchFamily="34" charset="0"/>
-                  <a:cs typeface="Times New Roman" panose="02020603050405020304" pitchFamily="18" charset="0"/>
-                </a:rPr>
-                <a:t>Verkauf</a:t>
-              </a:r>
-              <a:endParaRPr lang="de-DE" sz="1400">
-                <a:effectLst/>
-                <a:latin typeface="Calibri" panose="020F0502020204030204" pitchFamily="34" charset="0"/>
-                <a:ea typeface="Calibri" panose="020F0502020204030204" pitchFamily="34" charset="0"/>
-                <a:cs typeface="Times New Roman" panose="02020603050405020304" pitchFamily="18" charset="0"/>
-              </a:endParaRPr>
-            </a:p>
-          </p:txBody>
-        </p:sp>
-        <p:sp>
-          <p:nvSpPr>
-            <p:cNvPr id="23" name="Text Box 12"/>
-            <p:cNvSpPr txBox="1"/>
-            <p:nvPr/>
-          </p:nvSpPr>
-          <p:spPr>
-            <a:xfrm>
-              <a:off x="4738647" y="4532135"/>
-              <a:ext cx="947327" cy="305435"/>
-            </a:xfrm>
-            <a:prstGeom prst="rect">
-              <a:avLst/>
-            </a:prstGeom>
-            <a:solidFill>
-              <a:schemeClr val="accent6">
-                <a:lumMod val="60000"/>
-                <a:lumOff val="40000"/>
-              </a:schemeClr>
-            </a:solidFill>
-            <a:ln w="6350">
-              <a:noFill/>
-            </a:ln>
-          </p:spPr>
-          <p:txBody>
-            <a:bodyPr rot="0" spcFirstLastPara="0" vert="horz" wrap="square" lIns="91440" tIns="45720" rIns="91440" bIns="45720" numCol="1" spcCol="0" rtlCol="0" fromWordArt="0" anchor="t" anchorCtr="0" forceAA="0" compatLnSpc="1">
-              <a:prstTxWarp prst="textNoShape">
-                <a:avLst/>
-              </a:prstTxWarp>
-              <a:noAutofit/>
-            </a:bodyPr>
-            <a:lstStyle/>
-            <a:p>
-              <a:pPr algn="ctr">
-                <a:lnSpc>
-                  <a:spcPct val="107000"/>
-                </a:lnSpc>
-                <a:spcAft>
-                  <a:spcPts val="800"/>
-                </a:spcAft>
-              </a:pPr>
-              <a:r>
-                <a:rPr lang="en-US" sz="1400">
-                  <a:effectLst/>
-                  <a:latin typeface="Calibri" panose="020F0502020204030204" pitchFamily="34" charset="0"/>
-                  <a:ea typeface="Calibri" panose="020F0502020204030204" pitchFamily="34" charset="0"/>
-                  <a:cs typeface="Times New Roman" panose="02020603050405020304" pitchFamily="18" charset="0"/>
-                </a:rPr>
-                <a:t>Einkauf</a:t>
-              </a:r>
-              <a:endParaRPr lang="de-DE" sz="1400">
-                <a:effectLst/>
-                <a:latin typeface="Calibri" panose="020F0502020204030204" pitchFamily="34" charset="0"/>
-                <a:ea typeface="Calibri" panose="020F0502020204030204" pitchFamily="34" charset="0"/>
-                <a:cs typeface="Times New Roman" panose="02020603050405020304" pitchFamily="18" charset="0"/>
-              </a:endParaRPr>
-            </a:p>
-          </p:txBody>
-        </p:sp>
-      </p:grpSp>
       <p:grpSp>
         <p:nvGrpSpPr>
           <p:cNvPr id="44" name="Group 43"/>
@@ -11234,6 +11185,817 @@
           </p:style>
         </p:cxnSp>
       </p:grpSp>
+      <p:grpSp>
+        <p:nvGrpSpPr>
+          <p:cNvPr id="9" name="Group 8">
+            <a:extLst>
+              <a:ext uri="{FF2B5EF4-FFF2-40B4-BE49-F238E27FC236}">
+                <a16:creationId xmlns:a16="http://schemas.microsoft.com/office/drawing/2014/main" id="{C918C03A-87D4-4236-8A97-1394EE312440}"/>
+              </a:ext>
+            </a:extLst>
+          </p:cNvPr>
+          <p:cNvGrpSpPr/>
+          <p:nvPr/>
+        </p:nvGrpSpPr>
+        <p:grpSpPr>
+          <a:xfrm>
+            <a:off x="7194430" y="2064589"/>
+            <a:ext cx="3381555" cy="2932981"/>
+            <a:chOff x="7194430" y="2064589"/>
+            <a:chExt cx="3381555" cy="2932981"/>
+          </a:xfrm>
+        </p:grpSpPr>
+        <p:grpSp>
+          <p:nvGrpSpPr>
+            <p:cNvPr id="7" name="Group 6"/>
+            <p:cNvGrpSpPr/>
+            <p:nvPr/>
+          </p:nvGrpSpPr>
+          <p:grpSpPr>
+            <a:xfrm>
+              <a:off x="7274957" y="2163149"/>
+              <a:ext cx="3214370" cy="2735672"/>
+              <a:chOff x="2590972" y="2239375"/>
+              <a:chExt cx="3214370" cy="2735672"/>
+            </a:xfrm>
+          </p:grpSpPr>
+          <p:sp>
+            <p:nvSpPr>
+              <p:cNvPr id="12" name="Text Box 1"/>
+              <p:cNvSpPr txBox="1"/>
+              <p:nvPr/>
+            </p:nvSpPr>
+            <p:spPr>
+              <a:xfrm>
+                <a:off x="2590972" y="2239375"/>
+                <a:ext cx="3214370" cy="819150"/>
+              </a:xfrm>
+              <a:prstGeom prst="rect">
+                <a:avLst/>
+              </a:prstGeom>
+              <a:solidFill>
+                <a:srgbClr val="434848"/>
+              </a:solidFill>
+              <a:ln w="12700">
+                <a:solidFill>
+                  <a:prstClr val="black"/>
+                </a:solidFill>
+              </a:ln>
+            </p:spPr>
+            <p:txBody>
+              <a:bodyPr rot="0" spcFirstLastPara="0" vert="horz" wrap="square" lIns="91440" tIns="45720" rIns="91440" bIns="45720" numCol="1" spcCol="0" rtlCol="0" fromWordArt="0" anchor="t" anchorCtr="0" forceAA="0" compatLnSpc="1">
+                <a:prstTxWarp prst="textNoShape">
+                  <a:avLst/>
+                </a:prstTxWarp>
+                <a:noAutofit/>
+              </a:bodyPr>
+              <a:lstStyle/>
+              <a:p>
+                <a:pPr algn="ctr">
+                  <a:lnSpc>
+                    <a:spcPct val="107000"/>
+                  </a:lnSpc>
+                  <a:spcAft>
+                    <a:spcPts val="800"/>
+                  </a:spcAft>
+                </a:pPr>
+                <a:r>
+                  <a:rPr lang="en-US" dirty="0" err="1">
+                    <a:solidFill>
+                      <a:srgbClr val="F6F8FA"/>
+                    </a:solidFill>
+                    <a:effectLst/>
+                    <a:latin typeface="Calibri" panose="020F0502020204030204" pitchFamily="34" charset="0"/>
+                    <a:ea typeface="Calibri" panose="020F0502020204030204" pitchFamily="34" charset="0"/>
+                    <a:cs typeface="Times New Roman" panose="02020603050405020304" pitchFamily="18" charset="0"/>
+                  </a:rPr>
+                  <a:t>Präsentation</a:t>
+                </a:r>
+                <a:endParaRPr lang="de-DE" sz="1100" dirty="0">
+                  <a:solidFill>
+                    <a:srgbClr val="F6F8FA"/>
+                  </a:solidFill>
+                  <a:effectLst/>
+                  <a:latin typeface="Calibri" panose="020F0502020204030204" pitchFamily="34" charset="0"/>
+                  <a:ea typeface="Calibri" panose="020F0502020204030204" pitchFamily="34" charset="0"/>
+                  <a:cs typeface="Times New Roman" panose="02020603050405020304" pitchFamily="18" charset="0"/>
+                </a:endParaRPr>
+              </a:p>
+            </p:txBody>
+          </p:sp>
+          <p:sp>
+            <p:nvSpPr>
+              <p:cNvPr id="13" name="Text Box 2"/>
+              <p:cNvSpPr txBox="1"/>
+              <p:nvPr/>
+            </p:nvSpPr>
+            <p:spPr>
+              <a:xfrm>
+                <a:off x="2719546" y="2615613"/>
+                <a:ext cx="947327" cy="304800"/>
+              </a:xfrm>
+              <a:prstGeom prst="rect">
+                <a:avLst/>
+              </a:prstGeom>
+              <a:solidFill>
+                <a:schemeClr val="accent1">
+                  <a:lumMod val="60000"/>
+                  <a:lumOff val="40000"/>
+                </a:schemeClr>
+              </a:solidFill>
+              <a:ln w="6350">
+                <a:noFill/>
+              </a:ln>
+            </p:spPr>
+            <p:txBody>
+              <a:bodyPr rot="0" spcFirstLastPara="0" vert="horz" wrap="square" lIns="91440" tIns="45720" rIns="91440" bIns="45720" numCol="1" spcCol="0" rtlCol="0" fromWordArt="0" anchor="t" anchorCtr="0" forceAA="0" compatLnSpc="1">
+                <a:prstTxWarp prst="textNoShape">
+                  <a:avLst/>
+                </a:prstTxWarp>
+                <a:noAutofit/>
+              </a:bodyPr>
+              <a:lstStyle/>
+              <a:p>
+                <a:pPr algn="ctr">
+                  <a:lnSpc>
+                    <a:spcPct val="107000"/>
+                  </a:lnSpc>
+                  <a:spcAft>
+                    <a:spcPts val="800"/>
+                  </a:spcAft>
+                </a:pPr>
+                <a:r>
+                  <a:rPr lang="en-US" sz="1400" dirty="0">
+                    <a:effectLst/>
+                    <a:latin typeface="Calibri" panose="020F0502020204030204" pitchFamily="34" charset="0"/>
+                    <a:ea typeface="Calibri" panose="020F0502020204030204" pitchFamily="34" charset="0"/>
+                    <a:cs typeface="Times New Roman" panose="02020603050405020304" pitchFamily="18" charset="0"/>
+                  </a:rPr>
+                  <a:t>Lager</a:t>
+                </a:r>
+                <a:endParaRPr lang="de-DE" sz="1400" dirty="0">
+                  <a:effectLst/>
+                  <a:latin typeface="Calibri" panose="020F0502020204030204" pitchFamily="34" charset="0"/>
+                  <a:ea typeface="Calibri" panose="020F0502020204030204" pitchFamily="34" charset="0"/>
+                  <a:cs typeface="Times New Roman" panose="02020603050405020304" pitchFamily="18" charset="0"/>
+                </a:endParaRPr>
+              </a:p>
+            </p:txBody>
+          </p:sp>
+          <p:sp>
+            <p:nvSpPr>
+              <p:cNvPr id="14" name="Text Box 3"/>
+              <p:cNvSpPr txBox="1"/>
+              <p:nvPr/>
+            </p:nvSpPr>
+            <p:spPr>
+              <a:xfrm>
+                <a:off x="3729097" y="2615613"/>
+                <a:ext cx="947645" cy="306000"/>
+              </a:xfrm>
+              <a:prstGeom prst="rect">
+                <a:avLst/>
+              </a:prstGeom>
+              <a:solidFill>
+                <a:schemeClr val="accent2">
+                  <a:lumMod val="60000"/>
+                  <a:lumOff val="40000"/>
+                </a:schemeClr>
+              </a:solidFill>
+              <a:ln w="6350">
+                <a:noFill/>
+              </a:ln>
+            </p:spPr>
+            <p:txBody>
+              <a:bodyPr rot="0" spcFirstLastPara="0" vert="horz" wrap="square" lIns="91440" tIns="45720" rIns="91440" bIns="45720" numCol="1" spcCol="0" rtlCol="0" fromWordArt="0" anchor="t" anchorCtr="0" forceAA="0" compatLnSpc="1">
+                <a:prstTxWarp prst="textNoShape">
+                  <a:avLst/>
+                </a:prstTxWarp>
+                <a:noAutofit/>
+              </a:bodyPr>
+              <a:lstStyle/>
+              <a:p>
+                <a:pPr algn="ctr">
+                  <a:lnSpc>
+                    <a:spcPct val="107000"/>
+                  </a:lnSpc>
+                  <a:spcAft>
+                    <a:spcPts val="800"/>
+                  </a:spcAft>
+                </a:pPr>
+                <a:r>
+                  <a:rPr lang="en-US" sz="1400">
+                    <a:effectLst/>
+                    <a:latin typeface="Calibri" panose="020F0502020204030204" pitchFamily="34" charset="0"/>
+                    <a:ea typeface="Calibri" panose="020F0502020204030204" pitchFamily="34" charset="0"/>
+                    <a:cs typeface="Times New Roman" panose="02020603050405020304" pitchFamily="18" charset="0"/>
+                  </a:rPr>
+                  <a:t>Verkauf</a:t>
+                </a:r>
+                <a:endParaRPr lang="de-DE" sz="1400">
+                  <a:effectLst/>
+                  <a:latin typeface="Calibri" panose="020F0502020204030204" pitchFamily="34" charset="0"/>
+                  <a:ea typeface="Calibri" panose="020F0502020204030204" pitchFamily="34" charset="0"/>
+                  <a:cs typeface="Times New Roman" panose="02020603050405020304" pitchFamily="18" charset="0"/>
+                </a:endParaRPr>
+              </a:p>
+            </p:txBody>
+          </p:sp>
+          <p:sp>
+            <p:nvSpPr>
+              <p:cNvPr id="15" name="Text Box 4"/>
+              <p:cNvSpPr txBox="1"/>
+              <p:nvPr/>
+            </p:nvSpPr>
+            <p:spPr>
+              <a:xfrm>
+                <a:off x="4738647" y="2615613"/>
+                <a:ext cx="947645" cy="306000"/>
+              </a:xfrm>
+              <a:prstGeom prst="rect">
+                <a:avLst/>
+              </a:prstGeom>
+              <a:solidFill>
+                <a:schemeClr val="accent6">
+                  <a:lumMod val="60000"/>
+                  <a:lumOff val="40000"/>
+                </a:schemeClr>
+              </a:solidFill>
+              <a:ln w="6350">
+                <a:noFill/>
+              </a:ln>
+            </p:spPr>
+            <p:txBody>
+              <a:bodyPr rot="0" spcFirstLastPara="0" vert="horz" wrap="square" lIns="91440" tIns="45720" rIns="91440" bIns="45720" numCol="1" spcCol="0" rtlCol="0" fromWordArt="0" anchor="t" anchorCtr="0" forceAA="0" compatLnSpc="1">
+                <a:prstTxWarp prst="textNoShape">
+                  <a:avLst/>
+                </a:prstTxWarp>
+                <a:noAutofit/>
+              </a:bodyPr>
+              <a:lstStyle/>
+              <a:p>
+                <a:pPr algn="ctr">
+                  <a:lnSpc>
+                    <a:spcPct val="107000"/>
+                  </a:lnSpc>
+                  <a:spcAft>
+                    <a:spcPts val="800"/>
+                  </a:spcAft>
+                </a:pPr>
+                <a:r>
+                  <a:rPr lang="en-US" sz="1400" dirty="0" err="1">
+                    <a:effectLst/>
+                    <a:latin typeface="Calibri" panose="020F0502020204030204" pitchFamily="34" charset="0"/>
+                    <a:ea typeface="Calibri" panose="020F0502020204030204" pitchFamily="34" charset="0"/>
+                    <a:cs typeface="Times New Roman" panose="02020603050405020304" pitchFamily="18" charset="0"/>
+                  </a:rPr>
+                  <a:t>Einkauf</a:t>
+                </a:r>
+                <a:endParaRPr lang="de-DE" sz="1400" dirty="0">
+                  <a:effectLst/>
+                  <a:latin typeface="Calibri" panose="020F0502020204030204" pitchFamily="34" charset="0"/>
+                  <a:ea typeface="Calibri" panose="020F0502020204030204" pitchFamily="34" charset="0"/>
+                  <a:cs typeface="Times New Roman" panose="02020603050405020304" pitchFamily="18" charset="0"/>
+                </a:endParaRPr>
+              </a:p>
+            </p:txBody>
+          </p:sp>
+          <p:sp>
+            <p:nvSpPr>
+              <p:cNvPr id="16" name="Text Box 5"/>
+              <p:cNvSpPr txBox="1"/>
+              <p:nvPr/>
+            </p:nvSpPr>
+            <p:spPr>
+              <a:xfrm>
+                <a:off x="2590972" y="3197636"/>
+                <a:ext cx="3214053" cy="819150"/>
+              </a:xfrm>
+              <a:prstGeom prst="rect">
+                <a:avLst/>
+              </a:prstGeom>
+              <a:solidFill>
+                <a:srgbClr val="434848"/>
+              </a:solidFill>
+              <a:ln w="12700">
+                <a:solidFill>
+                  <a:prstClr val="black"/>
+                </a:solidFill>
+              </a:ln>
+            </p:spPr>
+            <p:txBody>
+              <a:bodyPr rot="0" spcFirstLastPara="0" vert="horz" wrap="square" lIns="91440" tIns="45720" rIns="91440" bIns="45720" numCol="1" spcCol="0" rtlCol="0" fromWordArt="0" anchor="t" anchorCtr="0" forceAA="0" compatLnSpc="1">
+                <a:prstTxWarp prst="textNoShape">
+                  <a:avLst/>
+                </a:prstTxWarp>
+                <a:noAutofit/>
+              </a:bodyPr>
+              <a:lstStyle/>
+              <a:p>
+                <a:pPr algn="ctr">
+                  <a:lnSpc>
+                    <a:spcPct val="107000"/>
+                  </a:lnSpc>
+                  <a:spcAft>
+                    <a:spcPts val="800"/>
+                  </a:spcAft>
+                </a:pPr>
+                <a:r>
+                  <a:rPr lang="en-US" dirty="0" err="1">
+                    <a:solidFill>
+                      <a:srgbClr val="F6F8FA"/>
+                    </a:solidFill>
+                    <a:effectLst/>
+                    <a:latin typeface="Calibri" panose="020F0502020204030204" pitchFamily="34" charset="0"/>
+                    <a:ea typeface="Calibri" panose="020F0502020204030204" pitchFamily="34" charset="0"/>
+                    <a:cs typeface="Times New Roman" panose="02020603050405020304" pitchFamily="18" charset="0"/>
+                  </a:rPr>
+                  <a:t>Geschäftslogik</a:t>
+                </a:r>
+                <a:endParaRPr lang="de-DE" sz="1100" dirty="0">
+                  <a:solidFill>
+                    <a:srgbClr val="F6F8FA"/>
+                  </a:solidFill>
+                  <a:effectLst/>
+                  <a:latin typeface="Calibri" panose="020F0502020204030204" pitchFamily="34" charset="0"/>
+                  <a:ea typeface="Calibri" panose="020F0502020204030204" pitchFamily="34" charset="0"/>
+                  <a:cs typeface="Times New Roman" panose="02020603050405020304" pitchFamily="18" charset="0"/>
+                </a:endParaRPr>
+              </a:p>
+            </p:txBody>
+          </p:sp>
+          <p:sp>
+            <p:nvSpPr>
+              <p:cNvPr id="17" name="Text Box 6"/>
+              <p:cNvSpPr txBox="1"/>
+              <p:nvPr/>
+            </p:nvSpPr>
+            <p:spPr>
+              <a:xfrm>
+                <a:off x="2719546" y="3573874"/>
+                <a:ext cx="947327" cy="304800"/>
+              </a:xfrm>
+              <a:prstGeom prst="rect">
+                <a:avLst/>
+              </a:prstGeom>
+              <a:solidFill>
+                <a:schemeClr val="accent1">
+                  <a:lumMod val="60000"/>
+                  <a:lumOff val="40000"/>
+                </a:schemeClr>
+              </a:solidFill>
+              <a:ln w="6350">
+                <a:noFill/>
+              </a:ln>
+            </p:spPr>
+            <p:txBody>
+              <a:bodyPr rot="0" spcFirstLastPara="0" vert="horz" wrap="square" lIns="91440" tIns="45720" rIns="91440" bIns="45720" numCol="1" spcCol="0" rtlCol="0" fromWordArt="0" anchor="t" anchorCtr="0" forceAA="0" compatLnSpc="1">
+                <a:prstTxWarp prst="textNoShape">
+                  <a:avLst/>
+                </a:prstTxWarp>
+                <a:noAutofit/>
+              </a:bodyPr>
+              <a:lstStyle/>
+              <a:p>
+                <a:pPr algn="ctr">
+                  <a:lnSpc>
+                    <a:spcPct val="107000"/>
+                  </a:lnSpc>
+                  <a:spcAft>
+                    <a:spcPts val="800"/>
+                  </a:spcAft>
+                </a:pPr>
+                <a:r>
+                  <a:rPr lang="en-US" sz="1400">
+                    <a:effectLst/>
+                    <a:latin typeface="Calibri" panose="020F0502020204030204" pitchFamily="34" charset="0"/>
+                    <a:ea typeface="Calibri" panose="020F0502020204030204" pitchFamily="34" charset="0"/>
+                    <a:cs typeface="Times New Roman" panose="02020603050405020304" pitchFamily="18" charset="0"/>
+                  </a:rPr>
+                  <a:t>Lager</a:t>
+                </a:r>
+                <a:endParaRPr lang="de-DE" sz="1400">
+                  <a:effectLst/>
+                  <a:latin typeface="Calibri" panose="020F0502020204030204" pitchFamily="34" charset="0"/>
+                  <a:ea typeface="Calibri" panose="020F0502020204030204" pitchFamily="34" charset="0"/>
+                  <a:cs typeface="Times New Roman" panose="02020603050405020304" pitchFamily="18" charset="0"/>
+                </a:endParaRPr>
+              </a:p>
+            </p:txBody>
+          </p:sp>
+          <p:sp>
+            <p:nvSpPr>
+              <p:cNvPr id="18" name="Text Box 7"/>
+              <p:cNvSpPr txBox="1"/>
+              <p:nvPr/>
+            </p:nvSpPr>
+            <p:spPr>
+              <a:xfrm>
+                <a:off x="3729097" y="3573874"/>
+                <a:ext cx="947327" cy="305435"/>
+              </a:xfrm>
+              <a:prstGeom prst="rect">
+                <a:avLst/>
+              </a:prstGeom>
+              <a:solidFill>
+                <a:schemeClr val="accent2">
+                  <a:lumMod val="60000"/>
+                  <a:lumOff val="40000"/>
+                </a:schemeClr>
+              </a:solidFill>
+              <a:ln w="6350">
+                <a:noFill/>
+              </a:ln>
+            </p:spPr>
+            <p:txBody>
+              <a:bodyPr rot="0" spcFirstLastPara="0" vert="horz" wrap="square" lIns="91440" tIns="45720" rIns="91440" bIns="45720" numCol="1" spcCol="0" rtlCol="0" fromWordArt="0" anchor="t" anchorCtr="0" forceAA="0" compatLnSpc="1">
+                <a:prstTxWarp prst="textNoShape">
+                  <a:avLst/>
+                </a:prstTxWarp>
+                <a:noAutofit/>
+              </a:bodyPr>
+              <a:lstStyle/>
+              <a:p>
+                <a:pPr algn="ctr">
+                  <a:lnSpc>
+                    <a:spcPct val="107000"/>
+                  </a:lnSpc>
+                  <a:spcAft>
+                    <a:spcPts val="800"/>
+                  </a:spcAft>
+                </a:pPr>
+                <a:r>
+                  <a:rPr lang="en-US" sz="1400">
+                    <a:effectLst/>
+                    <a:latin typeface="Calibri" panose="020F0502020204030204" pitchFamily="34" charset="0"/>
+                    <a:ea typeface="Calibri" panose="020F0502020204030204" pitchFamily="34" charset="0"/>
+                    <a:cs typeface="Times New Roman" panose="02020603050405020304" pitchFamily="18" charset="0"/>
+                  </a:rPr>
+                  <a:t>Verkauf</a:t>
+                </a:r>
+                <a:endParaRPr lang="de-DE" sz="1400">
+                  <a:effectLst/>
+                  <a:latin typeface="Calibri" panose="020F0502020204030204" pitchFamily="34" charset="0"/>
+                  <a:ea typeface="Calibri" panose="020F0502020204030204" pitchFamily="34" charset="0"/>
+                  <a:cs typeface="Times New Roman" panose="02020603050405020304" pitchFamily="18" charset="0"/>
+                </a:endParaRPr>
+              </a:p>
+            </p:txBody>
+          </p:sp>
+          <p:sp>
+            <p:nvSpPr>
+              <p:cNvPr id="19" name="Text Box 8"/>
+              <p:cNvSpPr txBox="1"/>
+              <p:nvPr/>
+            </p:nvSpPr>
+            <p:spPr>
+              <a:xfrm>
+                <a:off x="4738647" y="3573874"/>
+                <a:ext cx="947327" cy="305435"/>
+              </a:xfrm>
+              <a:prstGeom prst="rect">
+                <a:avLst/>
+              </a:prstGeom>
+              <a:solidFill>
+                <a:schemeClr val="accent6">
+                  <a:lumMod val="60000"/>
+                  <a:lumOff val="40000"/>
+                </a:schemeClr>
+              </a:solidFill>
+              <a:ln w="6350">
+                <a:noFill/>
+              </a:ln>
+            </p:spPr>
+            <p:txBody>
+              <a:bodyPr rot="0" spcFirstLastPara="0" vert="horz" wrap="square" lIns="91440" tIns="45720" rIns="91440" bIns="45720" numCol="1" spcCol="0" rtlCol="0" fromWordArt="0" anchor="t" anchorCtr="0" forceAA="0" compatLnSpc="1">
+                <a:prstTxWarp prst="textNoShape">
+                  <a:avLst/>
+                </a:prstTxWarp>
+                <a:noAutofit/>
+              </a:bodyPr>
+              <a:lstStyle/>
+              <a:p>
+                <a:pPr algn="ctr">
+                  <a:lnSpc>
+                    <a:spcPct val="107000"/>
+                  </a:lnSpc>
+                  <a:spcAft>
+                    <a:spcPts val="800"/>
+                  </a:spcAft>
+                </a:pPr>
+                <a:r>
+                  <a:rPr lang="en-US" sz="1400">
+                    <a:effectLst/>
+                    <a:latin typeface="Calibri" panose="020F0502020204030204" pitchFamily="34" charset="0"/>
+                    <a:ea typeface="Calibri" panose="020F0502020204030204" pitchFamily="34" charset="0"/>
+                    <a:cs typeface="Times New Roman" panose="02020603050405020304" pitchFamily="18" charset="0"/>
+                  </a:rPr>
+                  <a:t>Einkauf</a:t>
+                </a:r>
+                <a:endParaRPr lang="de-DE" sz="1400">
+                  <a:effectLst/>
+                  <a:latin typeface="Calibri" panose="020F0502020204030204" pitchFamily="34" charset="0"/>
+                  <a:ea typeface="Calibri" panose="020F0502020204030204" pitchFamily="34" charset="0"/>
+                  <a:cs typeface="Times New Roman" panose="02020603050405020304" pitchFamily="18" charset="0"/>
+                </a:endParaRPr>
+              </a:p>
+            </p:txBody>
+          </p:sp>
+          <p:sp>
+            <p:nvSpPr>
+              <p:cNvPr id="20" name="Text Box 9"/>
+              <p:cNvSpPr txBox="1"/>
+              <p:nvPr/>
+            </p:nvSpPr>
+            <p:spPr>
+              <a:xfrm>
+                <a:off x="2590972" y="4155897"/>
+                <a:ext cx="3214053" cy="819150"/>
+              </a:xfrm>
+              <a:prstGeom prst="rect">
+                <a:avLst/>
+              </a:prstGeom>
+              <a:solidFill>
+                <a:srgbClr val="434848"/>
+              </a:solidFill>
+              <a:ln w="12700">
+                <a:solidFill>
+                  <a:prstClr val="black"/>
+                </a:solidFill>
+              </a:ln>
+            </p:spPr>
+            <p:txBody>
+              <a:bodyPr rot="0" spcFirstLastPara="0" vert="horz" wrap="square" lIns="91440" tIns="45720" rIns="91440" bIns="45720" numCol="1" spcCol="0" rtlCol="0" fromWordArt="0" anchor="t" anchorCtr="0" forceAA="0" compatLnSpc="1">
+                <a:prstTxWarp prst="textNoShape">
+                  <a:avLst/>
+                </a:prstTxWarp>
+                <a:noAutofit/>
+              </a:bodyPr>
+              <a:lstStyle/>
+              <a:p>
+                <a:pPr algn="ctr">
+                  <a:lnSpc>
+                    <a:spcPct val="107000"/>
+                  </a:lnSpc>
+                  <a:spcAft>
+                    <a:spcPts val="800"/>
+                  </a:spcAft>
+                </a:pPr>
+                <a:r>
+                  <a:rPr lang="en-US" dirty="0" err="1">
+                    <a:solidFill>
+                      <a:srgbClr val="F6F8FA"/>
+                    </a:solidFill>
+                    <a:effectLst/>
+                    <a:latin typeface="Calibri" panose="020F0502020204030204" pitchFamily="34" charset="0"/>
+                    <a:ea typeface="Calibri" panose="020F0502020204030204" pitchFamily="34" charset="0"/>
+                    <a:cs typeface="Times New Roman" panose="02020603050405020304" pitchFamily="18" charset="0"/>
+                  </a:rPr>
+                  <a:t>Datenzugriff</a:t>
+                </a:r>
+                <a:endParaRPr lang="de-DE" sz="1100" dirty="0">
+                  <a:solidFill>
+                    <a:srgbClr val="F6F8FA"/>
+                  </a:solidFill>
+                  <a:effectLst/>
+                  <a:latin typeface="Calibri" panose="020F0502020204030204" pitchFamily="34" charset="0"/>
+                  <a:ea typeface="Calibri" panose="020F0502020204030204" pitchFamily="34" charset="0"/>
+                  <a:cs typeface="Times New Roman" panose="02020603050405020304" pitchFamily="18" charset="0"/>
+                </a:endParaRPr>
+              </a:p>
+            </p:txBody>
+          </p:sp>
+          <p:sp>
+            <p:nvSpPr>
+              <p:cNvPr id="21" name="Text Box 10"/>
+              <p:cNvSpPr txBox="1"/>
+              <p:nvPr/>
+            </p:nvSpPr>
+            <p:spPr>
+              <a:xfrm>
+                <a:off x="2719546" y="4532135"/>
+                <a:ext cx="947327" cy="304800"/>
+              </a:xfrm>
+              <a:prstGeom prst="rect">
+                <a:avLst/>
+              </a:prstGeom>
+              <a:solidFill>
+                <a:schemeClr val="accent1">
+                  <a:lumMod val="60000"/>
+                  <a:lumOff val="40000"/>
+                </a:schemeClr>
+              </a:solidFill>
+              <a:ln w="6350">
+                <a:noFill/>
+              </a:ln>
+            </p:spPr>
+            <p:txBody>
+              <a:bodyPr rot="0" spcFirstLastPara="0" vert="horz" wrap="square" lIns="91440" tIns="45720" rIns="91440" bIns="45720" numCol="1" spcCol="0" rtlCol="0" fromWordArt="0" anchor="t" anchorCtr="0" forceAA="0" compatLnSpc="1">
+                <a:prstTxWarp prst="textNoShape">
+                  <a:avLst/>
+                </a:prstTxWarp>
+                <a:noAutofit/>
+              </a:bodyPr>
+              <a:lstStyle/>
+              <a:p>
+                <a:pPr algn="ctr">
+                  <a:lnSpc>
+                    <a:spcPct val="107000"/>
+                  </a:lnSpc>
+                  <a:spcAft>
+                    <a:spcPts val="800"/>
+                  </a:spcAft>
+                </a:pPr>
+                <a:r>
+                  <a:rPr lang="en-US" sz="1400">
+                    <a:effectLst/>
+                    <a:latin typeface="Calibri" panose="020F0502020204030204" pitchFamily="34" charset="0"/>
+                    <a:ea typeface="Calibri" panose="020F0502020204030204" pitchFamily="34" charset="0"/>
+                    <a:cs typeface="Times New Roman" panose="02020603050405020304" pitchFamily="18" charset="0"/>
+                  </a:rPr>
+                  <a:t>Lager</a:t>
+                </a:r>
+                <a:endParaRPr lang="de-DE" sz="1400">
+                  <a:effectLst/>
+                  <a:latin typeface="Calibri" panose="020F0502020204030204" pitchFamily="34" charset="0"/>
+                  <a:ea typeface="Calibri" panose="020F0502020204030204" pitchFamily="34" charset="0"/>
+                  <a:cs typeface="Times New Roman" panose="02020603050405020304" pitchFamily="18" charset="0"/>
+                </a:endParaRPr>
+              </a:p>
+            </p:txBody>
+          </p:sp>
+          <p:sp>
+            <p:nvSpPr>
+              <p:cNvPr id="22" name="Text Box 11"/>
+              <p:cNvSpPr txBox="1"/>
+              <p:nvPr/>
+            </p:nvSpPr>
+            <p:spPr>
+              <a:xfrm>
+                <a:off x="3729097" y="4532135"/>
+                <a:ext cx="947327" cy="305435"/>
+              </a:xfrm>
+              <a:prstGeom prst="rect">
+                <a:avLst/>
+              </a:prstGeom>
+              <a:solidFill>
+                <a:schemeClr val="accent2">
+                  <a:lumMod val="60000"/>
+                  <a:lumOff val="40000"/>
+                </a:schemeClr>
+              </a:solidFill>
+              <a:ln w="6350">
+                <a:noFill/>
+              </a:ln>
+            </p:spPr>
+            <p:txBody>
+              <a:bodyPr rot="0" spcFirstLastPara="0" vert="horz" wrap="square" lIns="91440" tIns="45720" rIns="91440" bIns="45720" numCol="1" spcCol="0" rtlCol="0" fromWordArt="0" anchor="t" anchorCtr="0" forceAA="0" compatLnSpc="1">
+                <a:prstTxWarp prst="textNoShape">
+                  <a:avLst/>
+                </a:prstTxWarp>
+                <a:noAutofit/>
+              </a:bodyPr>
+              <a:lstStyle/>
+              <a:p>
+                <a:pPr algn="ctr">
+                  <a:lnSpc>
+                    <a:spcPct val="107000"/>
+                  </a:lnSpc>
+                  <a:spcAft>
+                    <a:spcPts val="800"/>
+                  </a:spcAft>
+                </a:pPr>
+                <a:r>
+                  <a:rPr lang="en-US" sz="1400">
+                    <a:effectLst/>
+                    <a:latin typeface="Calibri" panose="020F0502020204030204" pitchFamily="34" charset="0"/>
+                    <a:ea typeface="Calibri" panose="020F0502020204030204" pitchFamily="34" charset="0"/>
+                    <a:cs typeface="Times New Roman" panose="02020603050405020304" pitchFamily="18" charset="0"/>
+                  </a:rPr>
+                  <a:t>Verkauf</a:t>
+                </a:r>
+                <a:endParaRPr lang="de-DE" sz="1400">
+                  <a:effectLst/>
+                  <a:latin typeface="Calibri" panose="020F0502020204030204" pitchFamily="34" charset="0"/>
+                  <a:ea typeface="Calibri" panose="020F0502020204030204" pitchFamily="34" charset="0"/>
+                  <a:cs typeface="Times New Roman" panose="02020603050405020304" pitchFamily="18" charset="0"/>
+                </a:endParaRPr>
+              </a:p>
+            </p:txBody>
+          </p:sp>
+          <p:sp>
+            <p:nvSpPr>
+              <p:cNvPr id="23" name="Text Box 12"/>
+              <p:cNvSpPr txBox="1"/>
+              <p:nvPr/>
+            </p:nvSpPr>
+            <p:spPr>
+              <a:xfrm>
+                <a:off x="4738647" y="4532135"/>
+                <a:ext cx="947327" cy="305435"/>
+              </a:xfrm>
+              <a:prstGeom prst="rect">
+                <a:avLst/>
+              </a:prstGeom>
+              <a:solidFill>
+                <a:schemeClr val="accent6">
+                  <a:lumMod val="60000"/>
+                  <a:lumOff val="40000"/>
+                </a:schemeClr>
+              </a:solidFill>
+              <a:ln w="6350">
+                <a:noFill/>
+              </a:ln>
+            </p:spPr>
+            <p:txBody>
+              <a:bodyPr rot="0" spcFirstLastPara="0" vert="horz" wrap="square" lIns="91440" tIns="45720" rIns="91440" bIns="45720" numCol="1" spcCol="0" rtlCol="0" fromWordArt="0" anchor="t" anchorCtr="0" forceAA="0" compatLnSpc="1">
+                <a:prstTxWarp prst="textNoShape">
+                  <a:avLst/>
+                </a:prstTxWarp>
+                <a:noAutofit/>
+              </a:bodyPr>
+              <a:lstStyle/>
+              <a:p>
+                <a:pPr algn="ctr">
+                  <a:lnSpc>
+                    <a:spcPct val="107000"/>
+                  </a:lnSpc>
+                  <a:spcAft>
+                    <a:spcPts val="800"/>
+                  </a:spcAft>
+                </a:pPr>
+                <a:r>
+                  <a:rPr lang="en-US" sz="1400">
+                    <a:effectLst/>
+                    <a:latin typeface="Calibri" panose="020F0502020204030204" pitchFamily="34" charset="0"/>
+                    <a:ea typeface="Calibri" panose="020F0502020204030204" pitchFamily="34" charset="0"/>
+                    <a:cs typeface="Times New Roman" panose="02020603050405020304" pitchFamily="18" charset="0"/>
+                  </a:rPr>
+                  <a:t>Einkauf</a:t>
+                </a:r>
+                <a:endParaRPr lang="de-DE" sz="1400">
+                  <a:effectLst/>
+                  <a:latin typeface="Calibri" panose="020F0502020204030204" pitchFamily="34" charset="0"/>
+                  <a:ea typeface="Calibri" panose="020F0502020204030204" pitchFamily="34" charset="0"/>
+                  <a:cs typeface="Times New Roman" panose="02020603050405020304" pitchFamily="18" charset="0"/>
+                </a:endParaRPr>
+              </a:p>
+            </p:txBody>
+          </p:sp>
+        </p:grpSp>
+        <p:sp>
+          <p:nvSpPr>
+            <p:cNvPr id="8" name="Rectangle 7">
+              <a:extLst>
+                <a:ext uri="{FF2B5EF4-FFF2-40B4-BE49-F238E27FC236}">
+                  <a16:creationId xmlns:a16="http://schemas.microsoft.com/office/drawing/2014/main" id="{B1FA897E-2F61-414C-B532-7914DC3860AD}"/>
+                </a:ext>
+              </a:extLst>
+            </p:cNvPr>
+            <p:cNvSpPr/>
+            <p:nvPr/>
+          </p:nvSpPr>
+          <p:spPr>
+            <a:xfrm>
+              <a:off x="7194430" y="2064589"/>
+              <a:ext cx="3381555" cy="2932981"/>
+            </a:xfrm>
+            <a:prstGeom prst="rect">
+              <a:avLst/>
+            </a:prstGeom>
+            <a:noFill/>
+            <a:ln w="19050">
+              <a:solidFill>
+                <a:srgbClr val="434848"/>
+              </a:solidFill>
+            </a:ln>
+          </p:spPr>
+          <p:style>
+            <a:lnRef idx="2">
+              <a:schemeClr val="accent1">
+                <a:shade val="50000"/>
+              </a:schemeClr>
+            </a:lnRef>
+            <a:fillRef idx="1">
+              <a:schemeClr val="accent1"/>
+            </a:fillRef>
+            <a:effectRef idx="0">
+              <a:schemeClr val="accent1"/>
+            </a:effectRef>
+            <a:fontRef idx="minor">
+              <a:schemeClr val="lt1"/>
+            </a:fontRef>
+          </p:style>
+          <p:txBody>
+            <a:bodyPr rtlCol="0" anchor="ctr"/>
+            <a:lstStyle/>
+            <a:p>
+              <a:pPr algn="ctr"/>
+              <a:endParaRPr lang="de-DE"/>
+            </a:p>
+          </p:txBody>
+        </p:sp>
+      </p:grpSp>
     </p:spTree>
     <p:extLst>
       <p:ext uri="{BB962C8B-B14F-4D97-AF65-F5344CB8AC3E}">
@@ -11265,7 +12027,7 @@
                             </p:stCondLst>
                             <p:childTnLst>
                               <p:par>
-                                <p:cTn id="5" presetID="1" presetClass="entr" presetSubtype="0" fill="hold" grpId="0" nodeType="clickEffect">
+                                <p:cTn id="5" presetID="1" presetClass="entr" presetSubtype="0" fill="hold" nodeType="clickEffect">
                                   <p:stCondLst>
                                     <p:cond delay="0"/>
                                   </p:stCondLst>
@@ -11278,38 +12040,7 @@
                                           </p:stCondLst>
                                         </p:cTn>
                                         <p:tgtEl>
-                                          <p:spTgt spid="3">
-                                            <p:txEl>
-                                              <p:pRg st="0" end="0"/>
-                                            </p:txEl>
-                                          </p:spTgt>
-                                        </p:tgtEl>
-                                        <p:attrNameLst>
-                                          <p:attrName>style.visibility</p:attrName>
-                                        </p:attrNameLst>
-                                      </p:cBhvr>
-                                      <p:to>
-                                        <p:strVal val="visible"/>
-                                      </p:to>
-                                    </p:set>
-                                  </p:childTnLst>
-                                </p:cTn>
-                              </p:par>
-                              <p:par>
-                                <p:cTn id="7" presetID="1" presetClass="entr" presetSubtype="0" fill="hold" nodeType="withEffect">
-                                  <p:stCondLst>
-                                    <p:cond delay="0"/>
-                                  </p:stCondLst>
-                                  <p:childTnLst>
-                                    <p:set>
-                                      <p:cBhvr>
-                                        <p:cTn id="8" dur="1" fill="hold">
-                                          <p:stCondLst>
-                                            <p:cond delay="0"/>
-                                          </p:stCondLst>
-                                        </p:cTn>
-                                        <p:tgtEl>
-                                          <p:spTgt spid="44"/>
+                                          <p:spTgt spid="9"/>
                                         </p:tgtEl>
                                         <p:attrNameLst>
                                           <p:attrName>style.visibility</p:attrName>
@@ -11329,19 +12060,46 @@
                     </p:cTn>
                   </p:par>
                   <p:par>
-                    <p:cTn id="9" fill="hold">
+                    <p:cTn id="7" fill="hold">
                       <p:stCondLst>
                         <p:cond delay="indefinite"/>
                       </p:stCondLst>
                       <p:childTnLst>
                         <p:par>
-                          <p:cTn id="10" fill="hold">
+                          <p:cTn id="8" fill="hold">
                             <p:stCondLst>
                               <p:cond delay="0"/>
                             </p:stCondLst>
                             <p:childTnLst>
                               <p:par>
-                                <p:cTn id="11" presetID="1" presetClass="entr" presetSubtype="0" fill="hold" grpId="0" nodeType="clickEffect">
+                                <p:cTn id="9" presetID="1" presetClass="exit" presetSubtype="0" fill="hold" nodeType="clickEffect">
+                                  <p:stCondLst>
+                                    <p:cond delay="0"/>
+                                  </p:stCondLst>
+                                  <p:childTnLst>
+                                    <p:set>
+                                      <p:cBhvr>
+                                        <p:cTn id="10" dur="1" fill="hold">
+                                          <p:stCondLst>
+                                            <p:cond delay="0"/>
+                                          </p:stCondLst>
+                                        </p:cTn>
+                                        <p:tgtEl>
+                                          <p:spTgt spid="9"/>
+                                        </p:tgtEl>
+                                        <p:attrNameLst>
+                                          <p:attrName>style.visibility</p:attrName>
+                                        </p:attrNameLst>
+                                      </p:cBhvr>
+                                      <p:to>
+                                        <p:strVal val="hidden"/>
+                                      </p:to>
+                                    </p:set>
+                                  </p:childTnLst>
+                                </p:cTn>
+                              </p:par>
+                              <p:par>
+                                <p:cTn id="11" presetID="1" presetClass="entr" presetSubtype="0" fill="hold" nodeType="withEffect">
                                   <p:stCondLst>
                                     <p:cond delay="0"/>
                                   </p:stCondLst>
@@ -11354,11 +12112,7 @@
                                           </p:stCondLst>
                                         </p:cTn>
                                         <p:tgtEl>
-                                          <p:spTgt spid="3">
-                                            <p:txEl>
-                                              <p:pRg st="1" end="1"/>
-                                            </p:txEl>
-                                          </p:spTgt>
+                                          <p:spTgt spid="44"/>
                                         </p:tgtEl>
                                         <p:attrNameLst>
                                           <p:attrName>style.visibility</p:attrName>
@@ -11387,7 +12141,7 @@
                                         <p:tgtEl>
                                           <p:spTgt spid="3">
                                             <p:txEl>
-                                              <p:pRg st="2" end="2"/>
+                                              <p:pRg st="0" end="0"/>
                                             </p:txEl>
                                           </p:spTgt>
                                         </p:tgtEl>
@@ -11436,7 +12190,7 @@
                                         <p:tgtEl>
                                           <p:spTgt spid="3">
                                             <p:txEl>
-                                              <p:pRg st="3" end="3"/>
+                                              <p:pRg st="1" end="1"/>
                                             </p:txEl>
                                           </p:spTgt>
                                         </p:tgtEl>
@@ -11467,6 +12221,86 @@
                                         <p:tgtEl>
                                           <p:spTgt spid="3">
                                             <p:txEl>
+                                              <p:pRg st="2" end="2"/>
+                                            </p:txEl>
+                                          </p:spTgt>
+                                        </p:tgtEl>
+                                        <p:attrNameLst>
+                                          <p:attrName>style.visibility</p:attrName>
+                                        </p:attrNameLst>
+                                      </p:cBhvr>
+                                      <p:to>
+                                        <p:strVal val="visible"/>
+                                      </p:to>
+                                    </p:set>
+                                  </p:childTnLst>
+                                </p:cTn>
+                              </p:par>
+                            </p:childTnLst>
+                          </p:cTn>
+                        </p:par>
+                      </p:childTnLst>
+                    </p:cTn>
+                  </p:par>
+                  <p:par>
+                    <p:cTn id="21" fill="hold">
+                      <p:stCondLst>
+                        <p:cond delay="indefinite"/>
+                      </p:stCondLst>
+                      <p:childTnLst>
+                        <p:par>
+                          <p:cTn id="22" fill="hold">
+                            <p:stCondLst>
+                              <p:cond delay="0"/>
+                            </p:stCondLst>
+                            <p:childTnLst>
+                              <p:par>
+                                <p:cTn id="23" presetID="1" presetClass="entr" presetSubtype="0" fill="hold" grpId="0" nodeType="clickEffect">
+                                  <p:stCondLst>
+                                    <p:cond delay="0"/>
+                                  </p:stCondLst>
+                                  <p:childTnLst>
+                                    <p:set>
+                                      <p:cBhvr>
+                                        <p:cTn id="24" dur="1" fill="hold">
+                                          <p:stCondLst>
+                                            <p:cond delay="0"/>
+                                          </p:stCondLst>
+                                        </p:cTn>
+                                        <p:tgtEl>
+                                          <p:spTgt spid="3">
+                                            <p:txEl>
+                                              <p:pRg st="3" end="3"/>
+                                            </p:txEl>
+                                          </p:spTgt>
+                                        </p:tgtEl>
+                                        <p:attrNameLst>
+                                          <p:attrName>style.visibility</p:attrName>
+                                        </p:attrNameLst>
+                                      </p:cBhvr>
+                                      <p:to>
+                                        <p:strVal val="visible"/>
+                                      </p:to>
+                                    </p:set>
+                                  </p:childTnLst>
+                                </p:cTn>
+                              </p:par>
+                              <p:par>
+                                <p:cTn id="25" presetID="1" presetClass="entr" presetSubtype="0" fill="hold" grpId="0" nodeType="withEffect">
+                                  <p:stCondLst>
+                                    <p:cond delay="0"/>
+                                  </p:stCondLst>
+                                  <p:childTnLst>
+                                    <p:set>
+                                      <p:cBhvr>
+                                        <p:cTn id="26" dur="1" fill="hold">
+                                          <p:stCondLst>
+                                            <p:cond delay="0"/>
+                                          </p:stCondLst>
+                                        </p:cTn>
+                                        <p:tgtEl>
+                                          <p:spTgt spid="3">
+                                            <p:txEl>
                                               <p:pRg st="4" end="4"/>
                                             </p:txEl>
                                           </p:spTgt>
@@ -11483,14 +12317,14 @@
                                 </p:cTn>
                               </p:par>
                               <p:par>
-                                <p:cTn id="21" presetID="1" presetClass="entr" presetSubtype="0" fill="hold" grpId="0" nodeType="withEffect">
+                                <p:cTn id="27" presetID="1" presetClass="entr" presetSubtype="0" fill="hold" grpId="0" nodeType="withEffect">
                                   <p:stCondLst>
                                     <p:cond delay="0"/>
                                   </p:stCondLst>
                                   <p:childTnLst>
                                     <p:set>
                                       <p:cBhvr>
-                                        <p:cTn id="22" dur="1" fill="hold">
+                                        <p:cTn id="28" dur="1" fill="hold">
                                           <p:stCondLst>
                                             <p:cond delay="0"/>
                                           </p:stCondLst>
@@ -11514,14 +12348,14 @@
                                 </p:cTn>
                               </p:par>
                               <p:par>
-                                <p:cTn id="23" presetID="1" presetClass="entr" presetSubtype="0" fill="hold" grpId="0" nodeType="withEffect">
+                                <p:cTn id="29" presetID="1" presetClass="entr" presetSubtype="0" fill="hold" grpId="0" nodeType="withEffect">
                                   <p:stCondLst>
                                     <p:cond delay="0"/>
                                   </p:stCondLst>
                                   <p:childTnLst>
                                     <p:set>
                                       <p:cBhvr>
-                                        <p:cTn id="24" dur="1" fill="hold">
+                                        <p:cTn id="30" dur="1" fill="hold">
                                           <p:stCondLst>
                                             <p:cond delay="0"/>
                                           </p:stCondLst>
@@ -11545,14 +12379,14 @@
                                 </p:cTn>
                               </p:par>
                               <p:par>
-                                <p:cTn id="25" presetID="1" presetClass="entr" presetSubtype="0" fill="hold" grpId="0" nodeType="withEffect">
+                                <p:cTn id="31" presetID="1" presetClass="entr" presetSubtype="0" fill="hold" grpId="0" nodeType="withEffect">
                                   <p:stCondLst>
                                     <p:cond delay="0"/>
                                   </p:stCondLst>
                                   <p:childTnLst>
                                     <p:set>
                                       <p:cBhvr>
-                                        <p:cTn id="26" dur="1" fill="hold">
+                                        <p:cTn id="32" dur="1" fill="hold">
                                           <p:stCondLst>
                                             <p:cond delay="0"/>
                                           </p:stCondLst>
@@ -11738,7 +12572,7 @@
           <a:p>
             <a:fld id="{FCD7E7C2-4B8F-4989-ACDA-BBBEECDFB473}" type="datetime1">
               <a:rPr lang="de-DE" smtClean="0"/>
-              <a:t>16.06.2017</a:t>
+              <a:t>24.06.2017</a:t>
             </a:fld>
             <a:endParaRPr lang="de-DE" dirty="0"/>
           </a:p>
@@ -13464,7 +14298,7 @@
           <a:p>
             <a:fld id="{FCD7E7C2-4B8F-4989-ACDA-BBBEECDFB473}" type="datetime1">
               <a:rPr lang="de-DE" smtClean="0"/>
-              <a:t>16.06.2017</a:t>
+              <a:t>24.06.2017</a:t>
             </a:fld>
             <a:endParaRPr lang="de-DE" dirty="0"/>
           </a:p>
@@ -14246,7 +15080,7 @@
           <a:p>
             <a:fld id="{FCD7E7C2-4B8F-4989-ACDA-BBBEECDFB473}" type="datetime1">
               <a:rPr lang="de-DE" smtClean="0"/>
-              <a:t>16.06.2017</a:t>
+              <a:t>24.06.2017</a:t>
             </a:fld>
             <a:endParaRPr lang="de-DE" dirty="0"/>
           </a:p>
@@ -15591,6 +16425,307 @@
   <p:clrMapOvr>
     <a:masterClrMapping/>
   </p:clrMapOvr>
+  <p:timing>
+    <p:tnLst>
+      <p:par>
+        <p:cTn id="1" dur="indefinite" restart="never" nodeType="tmRoot">
+          <p:childTnLst>
+            <p:seq concurrent="1" nextAc="seek">
+              <p:cTn id="2" dur="indefinite" nodeType="mainSeq">
+                <p:childTnLst>
+                  <p:par>
+                    <p:cTn id="3" fill="hold">
+                      <p:stCondLst>
+                        <p:cond delay="indefinite"/>
+                      </p:stCondLst>
+                      <p:childTnLst>
+                        <p:par>
+                          <p:cTn id="4" fill="hold">
+                            <p:stCondLst>
+                              <p:cond delay="0"/>
+                            </p:stCondLst>
+                            <p:childTnLst>
+                              <p:par>
+                                <p:cTn id="5" presetID="1" presetClass="entr" presetSubtype="0" fill="hold" nodeType="clickEffect">
+                                  <p:stCondLst>
+                                    <p:cond delay="0"/>
+                                  </p:stCondLst>
+                                  <p:childTnLst>
+                                    <p:set>
+                                      <p:cBhvr>
+                                        <p:cTn id="6" dur="1" fill="hold">
+                                          <p:stCondLst>
+                                            <p:cond delay="0"/>
+                                          </p:stCondLst>
+                                        </p:cTn>
+                                        <p:tgtEl>
+                                          <p:spTgt spid="3">
+                                            <p:txEl>
+                                              <p:pRg st="4" end="4"/>
+                                            </p:txEl>
+                                          </p:spTgt>
+                                        </p:tgtEl>
+                                        <p:attrNameLst>
+                                          <p:attrName>style.visibility</p:attrName>
+                                        </p:attrNameLst>
+                                      </p:cBhvr>
+                                      <p:to>
+                                        <p:strVal val="visible"/>
+                                      </p:to>
+                                    </p:set>
+                                  </p:childTnLst>
+                                </p:cTn>
+                              </p:par>
+                              <p:par>
+                                <p:cTn id="7" presetID="1" presetClass="entr" presetSubtype="0" fill="hold" nodeType="withEffect">
+                                  <p:stCondLst>
+                                    <p:cond delay="0"/>
+                                  </p:stCondLst>
+                                  <p:childTnLst>
+                                    <p:set>
+                                      <p:cBhvr>
+                                        <p:cTn id="8" dur="1" fill="hold">
+                                          <p:stCondLst>
+                                            <p:cond delay="0"/>
+                                          </p:stCondLst>
+                                        </p:cTn>
+                                        <p:tgtEl>
+                                          <p:spTgt spid="3">
+                                            <p:txEl>
+                                              <p:pRg st="5" end="5"/>
+                                            </p:txEl>
+                                          </p:spTgt>
+                                        </p:tgtEl>
+                                        <p:attrNameLst>
+                                          <p:attrName>style.visibility</p:attrName>
+                                        </p:attrNameLst>
+                                      </p:cBhvr>
+                                      <p:to>
+                                        <p:strVal val="visible"/>
+                                      </p:to>
+                                    </p:set>
+                                  </p:childTnLst>
+                                </p:cTn>
+                              </p:par>
+                              <p:par>
+                                <p:cTn id="9" presetID="1" presetClass="entr" presetSubtype="0" fill="hold" nodeType="withEffect">
+                                  <p:stCondLst>
+                                    <p:cond delay="0"/>
+                                  </p:stCondLst>
+                                  <p:childTnLst>
+                                    <p:set>
+                                      <p:cBhvr>
+                                        <p:cTn id="10" dur="1" fill="hold">
+                                          <p:stCondLst>
+                                            <p:cond delay="0"/>
+                                          </p:stCondLst>
+                                        </p:cTn>
+                                        <p:tgtEl>
+                                          <p:spTgt spid="3">
+                                            <p:txEl>
+                                              <p:pRg st="6" end="6"/>
+                                            </p:txEl>
+                                          </p:spTgt>
+                                        </p:tgtEl>
+                                        <p:attrNameLst>
+                                          <p:attrName>style.visibility</p:attrName>
+                                        </p:attrNameLst>
+                                      </p:cBhvr>
+                                      <p:to>
+                                        <p:strVal val="visible"/>
+                                      </p:to>
+                                    </p:set>
+                                  </p:childTnLst>
+                                </p:cTn>
+                              </p:par>
+                              <p:par>
+                                <p:cTn id="11" presetID="1" presetClass="entr" presetSubtype="0" fill="hold" nodeType="withEffect">
+                                  <p:stCondLst>
+                                    <p:cond delay="0"/>
+                                  </p:stCondLst>
+                                  <p:childTnLst>
+                                    <p:set>
+                                      <p:cBhvr>
+                                        <p:cTn id="12" dur="1" fill="hold">
+                                          <p:stCondLst>
+                                            <p:cond delay="0"/>
+                                          </p:stCondLst>
+                                        </p:cTn>
+                                        <p:tgtEl>
+                                          <p:spTgt spid="3">
+                                            <p:txEl>
+                                              <p:pRg st="7" end="7"/>
+                                            </p:txEl>
+                                          </p:spTgt>
+                                        </p:tgtEl>
+                                        <p:attrNameLst>
+                                          <p:attrName>style.visibility</p:attrName>
+                                        </p:attrNameLst>
+                                      </p:cBhvr>
+                                      <p:to>
+                                        <p:strVal val="visible"/>
+                                      </p:to>
+                                    </p:set>
+                                  </p:childTnLst>
+                                </p:cTn>
+                              </p:par>
+                            </p:childTnLst>
+                          </p:cTn>
+                        </p:par>
+                      </p:childTnLst>
+                    </p:cTn>
+                  </p:par>
+                  <p:par>
+                    <p:cTn id="13" fill="hold">
+                      <p:stCondLst>
+                        <p:cond delay="indefinite"/>
+                      </p:stCondLst>
+                      <p:childTnLst>
+                        <p:par>
+                          <p:cTn id="14" fill="hold">
+                            <p:stCondLst>
+                              <p:cond delay="0"/>
+                            </p:stCondLst>
+                            <p:childTnLst>
+                              <p:par>
+                                <p:cTn id="15" presetID="1" presetClass="entr" presetSubtype="0" fill="hold" nodeType="clickEffect">
+                                  <p:stCondLst>
+                                    <p:cond delay="0"/>
+                                  </p:stCondLst>
+                                  <p:childTnLst>
+                                    <p:set>
+                                      <p:cBhvr>
+                                        <p:cTn id="16" dur="1" fill="hold">
+                                          <p:stCondLst>
+                                            <p:cond delay="0"/>
+                                          </p:stCondLst>
+                                        </p:cTn>
+                                        <p:tgtEl>
+                                          <p:spTgt spid="3">
+                                            <p:txEl>
+                                              <p:pRg st="8" end="8"/>
+                                            </p:txEl>
+                                          </p:spTgt>
+                                        </p:tgtEl>
+                                        <p:attrNameLst>
+                                          <p:attrName>style.visibility</p:attrName>
+                                        </p:attrNameLst>
+                                      </p:cBhvr>
+                                      <p:to>
+                                        <p:strVal val="visible"/>
+                                      </p:to>
+                                    </p:set>
+                                  </p:childTnLst>
+                                </p:cTn>
+                              </p:par>
+                            </p:childTnLst>
+                          </p:cTn>
+                        </p:par>
+                      </p:childTnLst>
+                    </p:cTn>
+                  </p:par>
+                  <p:par>
+                    <p:cTn id="17" fill="hold">
+                      <p:stCondLst>
+                        <p:cond delay="indefinite"/>
+                      </p:stCondLst>
+                      <p:childTnLst>
+                        <p:par>
+                          <p:cTn id="18" fill="hold">
+                            <p:stCondLst>
+                              <p:cond delay="0"/>
+                            </p:stCondLst>
+                            <p:childTnLst>
+                              <p:par>
+                                <p:cTn id="19" presetID="1" presetClass="entr" presetSubtype="0" fill="hold" nodeType="clickEffect">
+                                  <p:stCondLst>
+                                    <p:cond delay="0"/>
+                                  </p:stCondLst>
+                                  <p:childTnLst>
+                                    <p:set>
+                                      <p:cBhvr>
+                                        <p:cTn id="20" dur="1" fill="hold">
+                                          <p:stCondLst>
+                                            <p:cond delay="0"/>
+                                          </p:stCondLst>
+                                        </p:cTn>
+                                        <p:tgtEl>
+                                          <p:spTgt spid="3">
+                                            <p:txEl>
+                                              <p:pRg st="9" end="9"/>
+                                            </p:txEl>
+                                          </p:spTgt>
+                                        </p:tgtEl>
+                                        <p:attrNameLst>
+                                          <p:attrName>style.visibility</p:attrName>
+                                        </p:attrNameLst>
+                                      </p:cBhvr>
+                                      <p:to>
+                                        <p:strVal val="visible"/>
+                                      </p:to>
+                                    </p:set>
+                                  </p:childTnLst>
+                                </p:cTn>
+                              </p:par>
+                              <p:par>
+                                <p:cTn id="21" presetID="1" presetClass="entr" presetSubtype="0" fill="hold" nodeType="withEffect">
+                                  <p:stCondLst>
+                                    <p:cond delay="0"/>
+                                  </p:stCondLst>
+                                  <p:childTnLst>
+                                    <p:set>
+                                      <p:cBhvr>
+                                        <p:cTn id="22" dur="1" fill="hold">
+                                          <p:stCondLst>
+                                            <p:cond delay="0"/>
+                                          </p:stCondLst>
+                                        </p:cTn>
+                                        <p:tgtEl>
+                                          <p:spTgt spid="3">
+                                            <p:txEl>
+                                              <p:pRg st="10" end="10"/>
+                                            </p:txEl>
+                                          </p:spTgt>
+                                        </p:tgtEl>
+                                        <p:attrNameLst>
+                                          <p:attrName>style.visibility</p:attrName>
+                                        </p:attrNameLst>
+                                      </p:cBhvr>
+                                      <p:to>
+                                        <p:strVal val="visible"/>
+                                      </p:to>
+                                    </p:set>
+                                  </p:childTnLst>
+                                </p:cTn>
+                              </p:par>
+                            </p:childTnLst>
+                          </p:cTn>
+                        </p:par>
+                      </p:childTnLst>
+                    </p:cTn>
+                  </p:par>
+                </p:childTnLst>
+              </p:cTn>
+              <p:prevCondLst>
+                <p:cond evt="onPrev" delay="0">
+                  <p:tgtEl>
+                    <p:sldTgt/>
+                  </p:tgtEl>
+                </p:cond>
+              </p:prevCondLst>
+              <p:nextCondLst>
+                <p:cond evt="onNext" delay="0">
+                  <p:tgtEl>
+                    <p:sldTgt/>
+                  </p:tgtEl>
+                </p:cond>
+              </p:nextCondLst>
+            </p:seq>
+          </p:childTnLst>
+        </p:cTn>
+      </p:par>
+    </p:tnLst>
+  </p:timing>
 </p:sld>
 </file>
 

</xml_diff>

<commit_message>
add correct date in final presenation
</commit_message>
<xml_diff>
--- a/presentation/20170106-master-defense.pptx
+++ b/presentation/20170106-master-defense.pptx
@@ -223,7 +223,7 @@
           <a:p>
             <a:fld id="{91A79A0D-7D40-48AF-9AC8-3B71E119E35B}" type="datetimeFigureOut">
               <a:rPr lang="de-DE" smtClean="0"/>
-              <a:t>24.06.2017</a:t>
+              <a:t>01.07.2017</a:t>
             </a:fld>
             <a:endParaRPr lang="de-DE"/>
           </a:p>
@@ -388,7 +388,7 @@
           <a:p>
             <a:fld id="{50B8443B-8591-4186-BA0E-583841011C27}" type="datetimeFigureOut">
               <a:rPr lang="de-DE" smtClean="0"/>
-              <a:t>24.06.2017</a:t>
+              <a:t>01.07.2017</a:t>
             </a:fld>
             <a:endParaRPr lang="de-DE"/>
           </a:p>
@@ -1397,7 +1397,7 @@
           <a:p>
             <a:fld id="{A5974D0C-3C07-4C76-9806-51838E346B84}" type="datetime1">
               <a:rPr lang="de-DE" smtClean="0"/>
-              <a:t>24.06.2017</a:t>
+              <a:t>01.07.2017</a:t>
             </a:fld>
             <a:endParaRPr lang="de-DE"/>
           </a:p>
@@ -1604,7 +1604,7 @@
           <a:p>
             <a:fld id="{548C4524-1C23-4F93-8032-046ADF7D363A}" type="datetime1">
               <a:rPr lang="de-DE" smtClean="0"/>
-              <a:t>24.06.2017</a:t>
+              <a:t>01.07.2017</a:t>
             </a:fld>
             <a:endParaRPr lang="de-DE"/>
           </a:p>
@@ -1832,7 +1832,7 @@
             <a:fld id="{FCD7E7C2-4B8F-4989-ACDA-BBBEECDFB473}" type="datetime1">
               <a:rPr lang="de-DE" smtClean="0"/>
               <a:pPr/>
-              <a:t>24.06.2017</a:t>
+              <a:t>01.07.2017</a:t>
             </a:fld>
             <a:endParaRPr lang="de-DE" dirty="0"/>
           </a:p>
@@ -2396,7 +2396,7 @@
           <a:p>
             <a:fld id="{B3521F2F-19F7-4745-A7E5-D6FC4A395C8D}" type="datetime1">
               <a:rPr lang="de-DE" smtClean="0"/>
-              <a:t>24.06.2017</a:t>
+              <a:t>01.07.2017</a:t>
             </a:fld>
             <a:endParaRPr lang="de-DE"/>
           </a:p>
@@ -2790,7 +2790,7 @@
           <a:p>
             <a:fld id="{5B03B32A-C2D8-44A4-B6F4-358B815D4703}" type="datetime1">
               <a:rPr lang="de-DE" smtClean="0"/>
-              <a:t>24.06.2017</a:t>
+              <a:t>01.07.2017</a:t>
             </a:fld>
             <a:endParaRPr lang="de-DE"/>
           </a:p>
@@ -2935,7 +2935,7 @@
           <a:p>
             <a:fld id="{6DC45F1C-52C5-4399-9FBB-A699DC92C7AE}" type="datetime1">
               <a:rPr lang="de-DE" smtClean="0"/>
-              <a:t>24.06.2017</a:t>
+              <a:t>01.07.2017</a:t>
             </a:fld>
             <a:endParaRPr lang="de-DE"/>
           </a:p>
@@ -3057,7 +3057,7 @@
           <a:p>
             <a:fld id="{5D7C8DF1-CB90-4C66-91F8-DAAE9ADE1353}" type="datetime1">
               <a:rPr lang="de-DE" smtClean="0"/>
-              <a:t>24.06.2017</a:t>
+              <a:t>01.07.2017</a:t>
             </a:fld>
             <a:endParaRPr lang="de-DE"/>
           </a:p>
@@ -3361,7 +3361,7 @@
           <a:p>
             <a:fld id="{6966B97A-897C-4531-94E8-5C4EA180FDBB}" type="datetime1">
               <a:rPr lang="de-DE" smtClean="0"/>
-              <a:t>24.06.2017</a:t>
+              <a:t>01.07.2017</a:t>
             </a:fld>
             <a:endParaRPr lang="de-DE"/>
           </a:p>
@@ -3641,7 +3641,7 @@
           <a:p>
             <a:fld id="{CCE2A79C-697E-42A0-AA75-FCDA7BBCDF59}" type="datetime1">
               <a:rPr lang="de-DE" smtClean="0"/>
-              <a:t>24.06.2017</a:t>
+              <a:t>01.07.2017</a:t>
             </a:fld>
             <a:endParaRPr lang="de-DE"/>
           </a:p>
@@ -4272,7 +4272,7 @@
             </a:r>
             <a:r>
               <a:rPr lang="de-DE" dirty="0"/>
-              <a:t> 01.06.2017</a:t>
+              <a:t> 03.07.2017</a:t>
             </a:r>
           </a:p>
         </p:txBody>
@@ -4443,7 +4443,7 @@
           <a:p>
             <a:fld id="{21944E0F-9EDA-4706-90E4-491605A404BD}" type="datetime1">
               <a:rPr lang="de-DE" smtClean="0"/>
-              <a:t>24.06.2017</a:t>
+              <a:t>01.07.2017</a:t>
             </a:fld>
             <a:endParaRPr lang="de-DE" dirty="0"/>
           </a:p>
@@ -5253,7 +5253,7 @@
             <a:fld id="{FCD7E7C2-4B8F-4989-ACDA-BBBEECDFB473}" type="datetime1">
               <a:rPr lang="de-DE" smtClean="0"/>
               <a:pPr/>
-              <a:t>24.06.2017</a:t>
+              <a:t>01.07.2017</a:t>
             </a:fld>
             <a:endParaRPr lang="de-DE" dirty="0"/>
           </a:p>
@@ -5679,7 +5679,7 @@
             <a:fld id="{FCD7E7C2-4B8F-4989-ACDA-BBBEECDFB473}" type="datetime1">
               <a:rPr lang="de-DE" smtClean="0"/>
               <a:pPr/>
-              <a:t>24.06.2017</a:t>
+              <a:t>01.07.2017</a:t>
             </a:fld>
             <a:endParaRPr lang="de-DE" dirty="0"/>
           </a:p>
@@ -6669,7 +6669,7 @@
             <a:fld id="{FCD7E7C2-4B8F-4989-ACDA-BBBEECDFB473}" type="datetime1">
               <a:rPr lang="de-DE" smtClean="0"/>
               <a:pPr/>
-              <a:t>24.06.2017</a:t>
+              <a:t>01.07.2017</a:t>
             </a:fld>
             <a:endParaRPr lang="de-DE" dirty="0"/>
           </a:p>
@@ -7292,8 +7292,8 @@
         </p:nvSpPr>
         <p:spPr>
           <a:xfrm>
-            <a:off x="0" y="-17254"/>
-            <a:ext cx="12192000" cy="6875253"/>
+            <a:off x="-57509" y="-17254"/>
+            <a:ext cx="12289766" cy="6924137"/>
           </a:xfrm>
           <a:prstGeom prst="rect">
             <a:avLst/>
@@ -8641,7 +8641,7 @@
             <a:fld id="{FCD7E7C2-4B8F-4989-ACDA-BBBEECDFB473}" type="datetime1">
               <a:rPr lang="de-DE" smtClean="0"/>
               <a:pPr/>
-              <a:t>24.06.2017</a:t>
+              <a:t>01.07.2017</a:t>
             </a:fld>
             <a:endParaRPr lang="de-DE" dirty="0"/>
           </a:p>
@@ -9419,7 +9419,7 @@
             <a:fld id="{FCD7E7C2-4B8F-4989-ACDA-BBBEECDFB473}" type="datetime1">
               <a:rPr lang="de-DE" smtClean="0"/>
               <a:pPr/>
-              <a:t>24.06.2017</a:t>
+              <a:t>01.07.2017</a:t>
             </a:fld>
             <a:endParaRPr lang="de-DE" dirty="0"/>
           </a:p>
@@ -9917,7 +9917,7 @@
           <a:p>
             <a:fld id="{0DCD4440-A392-468D-9172-BE099E311DC2}" type="datetime1">
               <a:rPr lang="de-DE" smtClean="0"/>
-              <a:t>24.06.2017</a:t>
+              <a:t>01.07.2017</a:t>
             </a:fld>
             <a:endParaRPr lang="de-DE" dirty="0"/>
           </a:p>
@@ -10098,7 +10098,7 @@
             <a:fld id="{FCD7E7C2-4B8F-4989-ACDA-BBBEECDFB473}" type="datetime1">
               <a:rPr lang="de-DE" smtClean="0"/>
               <a:pPr/>
-              <a:t>24.06.2017</a:t>
+              <a:t>01.07.2017</a:t>
             </a:fld>
             <a:endParaRPr lang="de-DE" dirty="0"/>
           </a:p>
@@ -10618,7 +10618,7 @@
           <a:p>
             <a:fld id="{FCD7E7C2-4B8F-4989-ACDA-BBBEECDFB473}" type="datetime1">
               <a:rPr lang="de-DE" smtClean="0"/>
-              <a:t>24.06.2017</a:t>
+              <a:t>01.07.2017</a:t>
             </a:fld>
             <a:endParaRPr lang="de-DE" dirty="0"/>
           </a:p>
@@ -12572,7 +12572,7 @@
           <a:p>
             <a:fld id="{FCD7E7C2-4B8F-4989-ACDA-BBBEECDFB473}" type="datetime1">
               <a:rPr lang="de-DE" smtClean="0"/>
-              <a:t>24.06.2017</a:t>
+              <a:t>01.07.2017</a:t>
             </a:fld>
             <a:endParaRPr lang="de-DE" dirty="0"/>
           </a:p>
@@ -14298,7 +14298,7 @@
           <a:p>
             <a:fld id="{FCD7E7C2-4B8F-4989-ACDA-BBBEECDFB473}" type="datetime1">
               <a:rPr lang="de-DE" smtClean="0"/>
-              <a:t>24.06.2017</a:t>
+              <a:t>01.07.2017</a:t>
             </a:fld>
             <a:endParaRPr lang="de-DE" dirty="0"/>
           </a:p>
@@ -15080,7 +15080,7 @@
           <a:p>
             <a:fld id="{FCD7E7C2-4B8F-4989-ACDA-BBBEECDFB473}" type="datetime1">
               <a:rPr lang="de-DE" smtClean="0"/>
-              <a:t>24.06.2017</a:t>
+              <a:t>01.07.2017</a:t>
             </a:fld>
             <a:endParaRPr lang="de-DE" dirty="0"/>
           </a:p>

</xml_diff>